<commit_message>
DB EF - Database - 11.JSON-Processing
</commit_message>
<xml_diff>
--- a/C#/DB/Entity Framework Core/08.Auto-Mapping-Objects/08. DB-Advanced-EF-Core-Auto-Mapping-Objects.pptx
+++ b/C#/DB/Entity Framework Core/08.Auto-Mapping-Objects/08. DB-Advanced-EF-Core-Auto-Mapping-Objects.pptx
@@ -183,7 +183,7 @@
       </p14:sectionLst>
     </p:ext>
     <p:ext uri="{EFAFB233-063F-42B5-8137-9DF3F51BA10A}">
-      <p15:sldGuideLst xmlns:p15="http://schemas.microsoft.com/office/powerpoint/2012/main">
+      <p15:sldGuideLst xmlns:p15="http://schemas.microsoft.com/office/powerpoint/2012/main" xmlns="">
         <p15:guide id="1" orient="horz" pos="2184" userDrawn="1">
           <p15:clr>
             <a:srgbClr val="A4A3A4"/>
@@ -197,7 +197,7 @@
       </p15:sldGuideLst>
     </p:ext>
     <p:ext uri="{2D200454-40CA-4A62-9FC3-DE9A4176ACB9}">
-      <p15:notesGuideLst xmlns:p15="http://schemas.microsoft.com/office/powerpoint/2012/main"/>
+      <p15:notesGuideLst xmlns:p15="http://schemas.microsoft.com/office/powerpoint/2012/main" xmlns=""/>
     </p:ext>
   </p:extLst>
 </p:presentation>
@@ -230,7 +230,7 @@
           <p:cNvPr id="2" name="Header Placeholder 1">
             <a:extLst>
               <a:ext uri="{FF2B5EF4-FFF2-40B4-BE49-F238E27FC236}">
-                <a16:creationId xmlns:a16="http://schemas.microsoft.com/office/drawing/2014/main" id="{56F20103-83CC-4A54-8FDE-9D37FC2629C0}"/>
+                <a16:creationId xmlns:a16="http://schemas.microsoft.com/office/drawing/2014/main" xmlns="" id="{56F20103-83CC-4A54-8FDE-9D37FC2629C0}"/>
               </a:ext>
             </a:extLst>
           </p:cNvPr>
@@ -267,7 +267,7 @@
           <p:cNvPr id="3" name="Date Placeholder 2">
             <a:extLst>
               <a:ext uri="{FF2B5EF4-FFF2-40B4-BE49-F238E27FC236}">
-                <a16:creationId xmlns:a16="http://schemas.microsoft.com/office/drawing/2014/main" id="{27A53962-26EF-44E4-9E69-61B1727AB1C2}"/>
+                <a16:creationId xmlns:a16="http://schemas.microsoft.com/office/drawing/2014/main" xmlns="" id="{27A53962-26EF-44E4-9E69-61B1727AB1C2}"/>
               </a:ext>
             </a:extLst>
           </p:cNvPr>
@@ -297,7 +297,7 @@
           <a:p>
             <a:fld id="{4E087215-0C8F-4762-A664-737A353EC9A4}" type="datetimeFigureOut">
               <a:rPr lang="bg-BG" smtClean="0"/>
-              <a:t>11.11.2019 г.</a:t>
+              <a:t>21.11.2019 г.</a:t>
             </a:fld>
             <a:endParaRPr lang="bg-BG"/>
           </a:p>
@@ -308,7 +308,7 @@
           <p:cNvPr id="4" name="Footer Placeholder 3">
             <a:extLst>
               <a:ext uri="{FF2B5EF4-FFF2-40B4-BE49-F238E27FC236}">
-                <a16:creationId xmlns:a16="http://schemas.microsoft.com/office/drawing/2014/main" id="{28A6967E-448F-4887-8FCB-34482EFBCC74}"/>
+                <a16:creationId xmlns:a16="http://schemas.microsoft.com/office/drawing/2014/main" xmlns="" id="{28A6967E-448F-4887-8FCB-34482EFBCC74}"/>
               </a:ext>
             </a:extLst>
           </p:cNvPr>
@@ -345,7 +345,7 @@
           <p:cNvPr id="5" name="Slide Number Placeholder 4">
             <a:extLst>
               <a:ext uri="{FF2B5EF4-FFF2-40B4-BE49-F238E27FC236}">
-                <a16:creationId xmlns:a16="http://schemas.microsoft.com/office/drawing/2014/main" id="{8B6554C2-DDBA-40E2-9536-53A07EC50274}"/>
+                <a16:creationId xmlns:a16="http://schemas.microsoft.com/office/drawing/2014/main" xmlns="" id="{8B6554C2-DDBA-40E2-9536-53A07EC50274}"/>
               </a:ext>
             </a:extLst>
           </p:cNvPr>
@@ -474,7 +474,7 @@
           <a:p>
             <a:fld id="{72D84649-876A-46C9-8472-14CB09C070D8}" type="datetimeFigureOut">
               <a:rPr lang="en-US" smtClean="0"/>
-              <a:t>11/11/2019</a:t>
+              <a:t>11/21/2019</a:t>
             </a:fld>
             <a:endParaRPr lang="en-US" dirty="0"/>
           </a:p>
@@ -2166,7 +2166,7 @@
           <p:cNvPr id="17" name="Picture 16">
             <a:extLst>
               <a:ext uri="{FF2B5EF4-FFF2-40B4-BE49-F238E27FC236}">
-                <a16:creationId xmlns:a16="http://schemas.microsoft.com/office/drawing/2014/main" id="{5B5A345C-2CD0-4932-A998-37B2D20BF028}"/>
+                <a16:creationId xmlns:a16="http://schemas.microsoft.com/office/drawing/2014/main" xmlns="" id="{5B5A345C-2CD0-4932-A998-37B2D20BF028}"/>
               </a:ext>
             </a:extLst>
           </p:cNvPr>
@@ -2195,7 +2195,7 @@
           <p:cNvPr id="33" name="Picture Placeholder 32">
             <a:extLst>
               <a:ext uri="{FF2B5EF4-FFF2-40B4-BE49-F238E27FC236}">
-                <a16:creationId xmlns:a16="http://schemas.microsoft.com/office/drawing/2014/main" id="{A04D819A-89E2-4714-8C56-1838BF467EF7}"/>
+                <a16:creationId xmlns:a16="http://schemas.microsoft.com/office/drawing/2014/main" xmlns="" id="{A04D819A-89E2-4714-8C56-1838BF467EF7}"/>
               </a:ext>
             </a:extLst>
           </p:cNvPr>
@@ -2237,7 +2237,7 @@
           <p:cNvPr id="35" name="Picture 34">
             <a:extLst>
               <a:ext uri="{FF2B5EF4-FFF2-40B4-BE49-F238E27FC236}">
-                <a16:creationId xmlns:a16="http://schemas.microsoft.com/office/drawing/2014/main" id="{951E7DA9-C5F0-43D9-B013-3BDF9EEF029D}"/>
+                <a16:creationId xmlns:a16="http://schemas.microsoft.com/office/drawing/2014/main" xmlns="" id="{951E7DA9-C5F0-43D9-B013-3BDF9EEF029D}"/>
               </a:ext>
             </a:extLst>
           </p:cNvPr>
@@ -2272,7 +2272,7 @@
           <p:cNvPr id="43" name="Subtitle 5">
             <a:extLst>
               <a:ext uri="{FF2B5EF4-FFF2-40B4-BE49-F238E27FC236}">
-                <a16:creationId xmlns:a16="http://schemas.microsoft.com/office/drawing/2014/main" id="{37BDB812-1395-4B02-ABCF-6A331EEE23E5}"/>
+                <a16:creationId xmlns:a16="http://schemas.microsoft.com/office/drawing/2014/main" xmlns="" id="{37BDB812-1395-4B02-ABCF-6A331EEE23E5}"/>
               </a:ext>
             </a:extLst>
           </p:cNvPr>
@@ -2320,7 +2320,7 @@
           <p:cNvPr id="19" name="Picture 18">
             <a:extLst>
               <a:ext uri="{FF2B5EF4-FFF2-40B4-BE49-F238E27FC236}">
-                <a16:creationId xmlns:a16="http://schemas.microsoft.com/office/drawing/2014/main" id="{4FAEB7CD-FF73-4344-9FE5-589B30F5AAF7}"/>
+                <a16:creationId xmlns:a16="http://schemas.microsoft.com/office/drawing/2014/main" xmlns="" id="{4FAEB7CD-FF73-4344-9FE5-589B30F5AAF7}"/>
               </a:ext>
             </a:extLst>
           </p:cNvPr>
@@ -2356,7 +2356,7 @@
           <p:cNvPr id="10" name="Picture 9">
             <a:extLst>
               <a:ext uri="{FF2B5EF4-FFF2-40B4-BE49-F238E27FC236}">
-                <a16:creationId xmlns:a16="http://schemas.microsoft.com/office/drawing/2014/main" id="{82DFEC2C-38C6-405B-AD0A-06879C50EFEE}"/>
+                <a16:creationId xmlns:a16="http://schemas.microsoft.com/office/drawing/2014/main" xmlns="" id="{82DFEC2C-38C6-405B-AD0A-06879C50EFEE}"/>
               </a:ext>
             </a:extLst>
           </p:cNvPr>
@@ -2391,7 +2391,7 @@
           <p:cNvPr id="15" name="Picture 14">
             <a:extLst>
               <a:ext uri="{FF2B5EF4-FFF2-40B4-BE49-F238E27FC236}">
-                <a16:creationId xmlns:a16="http://schemas.microsoft.com/office/drawing/2014/main" id="{D7483B54-1DD1-4FC4-9FA0-4872F8C409C8}"/>
+                <a16:creationId xmlns:a16="http://schemas.microsoft.com/office/drawing/2014/main" xmlns="" id="{D7483B54-1DD1-4FC4-9FA0-4872F8C409C8}"/>
               </a:ext>
             </a:extLst>
           </p:cNvPr>
@@ -2426,7 +2426,7 @@
           <p:cNvPr id="2" name="Title 1">
             <a:extLst>
               <a:ext uri="{FF2B5EF4-FFF2-40B4-BE49-F238E27FC236}">
-                <a16:creationId xmlns:a16="http://schemas.microsoft.com/office/drawing/2014/main" id="{A4DF3AB8-E6E3-4FCE-8A4A-ECD147720A5D}"/>
+                <a16:creationId xmlns:a16="http://schemas.microsoft.com/office/drawing/2014/main" xmlns="" id="{A4DF3AB8-E6E3-4FCE-8A4A-ECD147720A5D}"/>
               </a:ext>
             </a:extLst>
           </p:cNvPr>
@@ -2464,7 +2464,7 @@
             <a:hlinkClick r:id="rId7" tooltip="This work is licensed under the &quot;Creative Commons Attribution-NonCommercial-ShareAlike 4.0 International&quot; license"/>
             <a:extLst>
               <a:ext uri="{FF2B5EF4-FFF2-40B4-BE49-F238E27FC236}">
-                <a16:creationId xmlns:a16="http://schemas.microsoft.com/office/drawing/2014/main" id="{7CB336FF-A768-4CE1-B1CE-FC103B348EA1}"/>
+                <a16:creationId xmlns:a16="http://schemas.microsoft.com/office/drawing/2014/main" xmlns="" id="{7CB336FF-A768-4CE1-B1CE-FC103B348EA1}"/>
               </a:ext>
             </a:extLst>
           </p:cNvPr>
@@ -2517,7 +2517,7 @@
           <p:cNvPr id="30" name="Text Placeholder 13">
             <a:extLst>
               <a:ext uri="{FF2B5EF4-FFF2-40B4-BE49-F238E27FC236}">
-                <a16:creationId xmlns:a16="http://schemas.microsoft.com/office/drawing/2014/main" id="{2EA92DCA-4DB5-4D03-ACD3-A6A296592D0C}"/>
+                <a16:creationId xmlns:a16="http://schemas.microsoft.com/office/drawing/2014/main" xmlns="" id="{2EA92DCA-4DB5-4D03-ACD3-A6A296592D0C}"/>
               </a:ext>
             </a:extLst>
           </p:cNvPr>
@@ -2579,7 +2579,7 @@
           <p:cNvPr id="31" name="Text Placeholder 13">
             <a:extLst>
               <a:ext uri="{FF2B5EF4-FFF2-40B4-BE49-F238E27FC236}">
-                <a16:creationId xmlns:a16="http://schemas.microsoft.com/office/drawing/2014/main" id="{3E6B87B7-9D33-4EBB-BD4F-C0436BA3FD72}"/>
+                <a16:creationId xmlns:a16="http://schemas.microsoft.com/office/drawing/2014/main" xmlns="" id="{3E6B87B7-9D33-4EBB-BD4F-C0436BA3FD72}"/>
               </a:ext>
             </a:extLst>
           </p:cNvPr>
@@ -2641,7 +2641,7 @@
           <p:cNvPr id="36" name="Text Placeholder 13">
             <a:extLst>
               <a:ext uri="{FF2B5EF4-FFF2-40B4-BE49-F238E27FC236}">
-                <a16:creationId xmlns:a16="http://schemas.microsoft.com/office/drawing/2014/main" id="{3B21F47B-DE1F-442D-A2B7-6866F8786704}"/>
+                <a16:creationId xmlns:a16="http://schemas.microsoft.com/office/drawing/2014/main" xmlns="" id="{3B21F47B-DE1F-442D-A2B7-6866F8786704}"/>
               </a:ext>
             </a:extLst>
           </p:cNvPr>
@@ -2701,7 +2701,7 @@
           <p:cNvPr id="40" name="Text Placeholder 13">
             <a:extLst>
               <a:ext uri="{FF2B5EF4-FFF2-40B4-BE49-F238E27FC236}">
-                <a16:creationId xmlns:a16="http://schemas.microsoft.com/office/drawing/2014/main" id="{CD940256-851E-46C8-8BFB-A5ECA6C7DA07}"/>
+                <a16:creationId xmlns:a16="http://schemas.microsoft.com/office/drawing/2014/main" xmlns="" id="{CD940256-851E-46C8-8BFB-A5ECA6C7DA07}"/>
               </a:ext>
             </a:extLst>
           </p:cNvPr>
@@ -2761,7 +2761,7 @@
           <p:cNvPr id="16" name="Rectangle 15">
             <a:extLst>
               <a:ext uri="{FF2B5EF4-FFF2-40B4-BE49-F238E27FC236}">
-                <a16:creationId xmlns:a16="http://schemas.microsoft.com/office/drawing/2014/main" id="{6854D183-0374-4B3E-B2CE-32F308A81591}"/>
+                <a16:creationId xmlns:a16="http://schemas.microsoft.com/office/drawing/2014/main" xmlns="" id="{6854D183-0374-4B3E-B2CE-32F308A81591}"/>
               </a:ext>
             </a:extLst>
           </p:cNvPr>
@@ -2842,7 +2842,7 @@
           <p:cNvPr id="18" name="Rectangle 17">
             <a:extLst>
               <a:ext uri="{FF2B5EF4-FFF2-40B4-BE49-F238E27FC236}">
-                <a16:creationId xmlns:a16="http://schemas.microsoft.com/office/drawing/2014/main" id="{34E5CD64-8E62-478C-BD07-29B0AE8E261B}"/>
+                <a16:creationId xmlns:a16="http://schemas.microsoft.com/office/drawing/2014/main" xmlns="" id="{34E5CD64-8E62-478C-BD07-29B0AE8E261B}"/>
               </a:ext>
             </a:extLst>
           </p:cNvPr>
@@ -2939,7 +2939,7 @@
   <p:hf hdr="0" ftr="0" dt="0"/>
   <p:extLst mod="1">
     <p:ext uri="{DCECCB84-F9BA-43D5-87BE-67443E8EF086}">
-      <p15:sldGuideLst xmlns:p15="http://schemas.microsoft.com/office/powerpoint/2012/main">
+      <p15:sldGuideLst xmlns:p15="http://schemas.microsoft.com/office/powerpoint/2012/main" xmlns="">
         <p15:guide id="1" orient="horz" pos="2160">
           <p15:clr>
             <a:srgbClr val="FBAE40"/>
@@ -2978,7 +2978,7 @@
           <p:cNvPr id="11" name="Picture 10">
             <a:extLst>
               <a:ext uri="{FF2B5EF4-FFF2-40B4-BE49-F238E27FC236}">
-                <a16:creationId xmlns:a16="http://schemas.microsoft.com/office/drawing/2014/main" id="{23609A8D-9063-4A88-A094-81A65D7DF417}"/>
+                <a16:creationId xmlns:a16="http://schemas.microsoft.com/office/drawing/2014/main" xmlns="" id="{23609A8D-9063-4A88-A094-81A65D7DF417}"/>
               </a:ext>
             </a:extLst>
           </p:cNvPr>
@@ -3007,7 +3007,7 @@
           <p:cNvPr id="17" name="Rectangle 16">
             <a:extLst>
               <a:ext uri="{FF2B5EF4-FFF2-40B4-BE49-F238E27FC236}">
-                <a16:creationId xmlns:a16="http://schemas.microsoft.com/office/drawing/2014/main" id="{4880F1A8-532C-4443-BDB9-44438A972E15}"/>
+                <a16:creationId xmlns:a16="http://schemas.microsoft.com/office/drawing/2014/main" xmlns="" id="{4880F1A8-532C-4443-BDB9-44438A972E15}"/>
               </a:ext>
             </a:extLst>
           </p:cNvPr>
@@ -3317,7 +3317,7 @@
           <p:cNvPr id="10" name="Rectangle 9">
             <a:extLst>
               <a:ext uri="{FF2B5EF4-FFF2-40B4-BE49-F238E27FC236}">
-                <a16:creationId xmlns:a16="http://schemas.microsoft.com/office/drawing/2014/main" id="{E9B994EC-35A8-4A11-98CB-25DC28852F94}"/>
+                <a16:creationId xmlns:a16="http://schemas.microsoft.com/office/drawing/2014/main" xmlns="" id="{E9B994EC-35A8-4A11-98CB-25DC28852F94}"/>
               </a:ext>
             </a:extLst>
           </p:cNvPr>
@@ -3398,7 +3398,7 @@
           <p:cNvPr id="14" name="Text Placeholder 13">
             <a:extLst>
               <a:ext uri="{FF2B5EF4-FFF2-40B4-BE49-F238E27FC236}">
-                <a16:creationId xmlns:a16="http://schemas.microsoft.com/office/drawing/2014/main" id="{A2ABE920-240F-4CF6-AD45-23ED489FAD6E}"/>
+                <a16:creationId xmlns:a16="http://schemas.microsoft.com/office/drawing/2014/main" xmlns="" id="{A2ABE920-240F-4CF6-AD45-23ED489FAD6E}"/>
               </a:ext>
             </a:extLst>
           </p:cNvPr>
@@ -3461,7 +3461,7 @@
           <p:cNvPr id="6" name="Title 5">
             <a:extLst>
               <a:ext uri="{FF2B5EF4-FFF2-40B4-BE49-F238E27FC236}">
-                <a16:creationId xmlns:a16="http://schemas.microsoft.com/office/drawing/2014/main" id="{2FF342A0-26CC-4ADA-AB90-FC4810F88E91}"/>
+                <a16:creationId xmlns:a16="http://schemas.microsoft.com/office/drawing/2014/main" xmlns="" id="{2FF342A0-26CC-4ADA-AB90-FC4810F88E91}"/>
               </a:ext>
             </a:extLst>
           </p:cNvPr>
@@ -3497,7 +3497,7 @@
           <p:cNvPr id="8" name="Date Placeholder 7">
             <a:extLst>
               <a:ext uri="{FF2B5EF4-FFF2-40B4-BE49-F238E27FC236}">
-                <a16:creationId xmlns:a16="http://schemas.microsoft.com/office/drawing/2014/main" id="{A66184F8-77F5-4000-AA69-383B07AEEF0D}"/>
+                <a16:creationId xmlns:a16="http://schemas.microsoft.com/office/drawing/2014/main" xmlns="" id="{A66184F8-77F5-4000-AA69-383B07AEEF0D}"/>
               </a:ext>
             </a:extLst>
           </p:cNvPr>
@@ -3516,7 +3516,7 @@
             <a:fld id="{055373AC-9AA7-423B-BA00-BA1C74164DBD}" type="datetime1">
               <a:rPr lang="en-US" smtClean="0"/>
               <a:pPr/>
-              <a:t>11/11/2019</a:t>
+              <a:t>11/21/2019</a:t>
             </a:fld>
             <a:endParaRPr lang="en-US" dirty="0"/>
           </a:p>
@@ -3527,7 +3527,7 @@
           <p:cNvPr id="9" name="Footer Placeholder 8">
             <a:extLst>
               <a:ext uri="{FF2B5EF4-FFF2-40B4-BE49-F238E27FC236}">
-                <a16:creationId xmlns:a16="http://schemas.microsoft.com/office/drawing/2014/main" id="{9CAD63B7-3B55-42B3-B63C-7488630C399B}"/>
+                <a16:creationId xmlns:a16="http://schemas.microsoft.com/office/drawing/2014/main" xmlns="" id="{9CAD63B7-3B55-42B3-B63C-7488630C399B}"/>
               </a:ext>
             </a:extLst>
           </p:cNvPr>
@@ -3552,7 +3552,7 @@
           <p:cNvPr id="15" name="Slide Number Placeholder 14">
             <a:extLst>
               <a:ext uri="{FF2B5EF4-FFF2-40B4-BE49-F238E27FC236}">
-                <a16:creationId xmlns:a16="http://schemas.microsoft.com/office/drawing/2014/main" id="{97A1733E-05EA-4892-9222-96356ACBDF86}"/>
+                <a16:creationId xmlns:a16="http://schemas.microsoft.com/office/drawing/2014/main" xmlns="" id="{97A1733E-05EA-4892-9222-96356ACBDF86}"/>
               </a:ext>
             </a:extLst>
           </p:cNvPr>
@@ -3582,7 +3582,7 @@
           <p:cNvPr id="16" name="Picture 15">
             <a:extLst>
               <a:ext uri="{FF2B5EF4-FFF2-40B4-BE49-F238E27FC236}">
-                <a16:creationId xmlns:a16="http://schemas.microsoft.com/office/drawing/2014/main" id="{2FE050E4-DC54-4CF4-A8D3-DC8B8DA04ECB}"/>
+                <a16:creationId xmlns:a16="http://schemas.microsoft.com/office/drawing/2014/main" xmlns="" id="{2FE050E4-DC54-4CF4-A8D3-DC8B8DA04ECB}"/>
               </a:ext>
             </a:extLst>
           </p:cNvPr>
@@ -3618,7 +3618,7 @@
           <p:cNvPr id="18" name="Rectangle 17">
             <a:extLst>
               <a:ext uri="{FF2B5EF4-FFF2-40B4-BE49-F238E27FC236}">
-                <a16:creationId xmlns:a16="http://schemas.microsoft.com/office/drawing/2014/main" id="{B2B94D3F-5DC8-4398-914C-4833ABE4CC19}"/>
+                <a16:creationId xmlns:a16="http://schemas.microsoft.com/office/drawing/2014/main" xmlns="" id="{B2B94D3F-5DC8-4398-914C-4833ABE4CC19}"/>
               </a:ext>
             </a:extLst>
           </p:cNvPr>
@@ -3746,7 +3746,7 @@
           <p:cNvPr id="36" name="Picture 35">
             <a:extLst>
               <a:ext uri="{FF2B5EF4-FFF2-40B4-BE49-F238E27FC236}">
-                <a16:creationId xmlns:a16="http://schemas.microsoft.com/office/drawing/2014/main" id="{B21D9C95-5FF6-4F7E-AC00-ED6F3DD385F0}"/>
+                <a16:creationId xmlns:a16="http://schemas.microsoft.com/office/drawing/2014/main" xmlns="" id="{B21D9C95-5FF6-4F7E-AC00-ED6F3DD385F0}"/>
               </a:ext>
             </a:extLst>
           </p:cNvPr>
@@ -3775,7 +3775,7 @@
           <p:cNvPr id="56" name="Picture 55">
             <a:extLst>
               <a:ext uri="{FF2B5EF4-FFF2-40B4-BE49-F238E27FC236}">
-                <a16:creationId xmlns:a16="http://schemas.microsoft.com/office/drawing/2014/main" id="{DEAD13D1-8921-41EB-9EDF-DA3F5121F449}"/>
+                <a16:creationId xmlns:a16="http://schemas.microsoft.com/office/drawing/2014/main" xmlns="" id="{DEAD13D1-8921-41EB-9EDF-DA3F5121F449}"/>
               </a:ext>
             </a:extLst>
           </p:cNvPr>
@@ -3804,7 +3804,7 @@
           <p:cNvPr id="19" name="Rectangle 18">
             <a:extLst>
               <a:ext uri="{FF2B5EF4-FFF2-40B4-BE49-F238E27FC236}">
-                <a16:creationId xmlns:a16="http://schemas.microsoft.com/office/drawing/2014/main" id="{7CFDBB16-985C-4CC7-B6DB-B81B36037922}"/>
+                <a16:creationId xmlns:a16="http://schemas.microsoft.com/office/drawing/2014/main" xmlns="" id="{7CFDBB16-985C-4CC7-B6DB-B81B36037922}"/>
               </a:ext>
             </a:extLst>
           </p:cNvPr>
@@ -3903,7 +3903,7 @@
           <p:cNvPr id="26" name="Picture 25">
             <a:extLst>
               <a:ext uri="{FF2B5EF4-FFF2-40B4-BE49-F238E27FC236}">
-                <a16:creationId xmlns:a16="http://schemas.microsoft.com/office/drawing/2014/main" id="{247CFF3C-C4FA-493D-8505-DF469F4D36A4}"/>
+                <a16:creationId xmlns:a16="http://schemas.microsoft.com/office/drawing/2014/main" xmlns="" id="{247CFF3C-C4FA-493D-8505-DF469F4D36A4}"/>
               </a:ext>
             </a:extLst>
           </p:cNvPr>
@@ -3939,7 +3939,7 @@
           <p:cNvPr id="42" name="Picture 41">
             <a:extLst>
               <a:ext uri="{FF2B5EF4-FFF2-40B4-BE49-F238E27FC236}">
-                <a16:creationId xmlns:a16="http://schemas.microsoft.com/office/drawing/2014/main" id="{320846EB-6FC8-4F9D-97D0-A1A8E9CEE0DE}"/>
+                <a16:creationId xmlns:a16="http://schemas.microsoft.com/office/drawing/2014/main" xmlns="" id="{320846EB-6FC8-4F9D-97D0-A1A8E9CEE0DE}"/>
               </a:ext>
             </a:extLst>
           </p:cNvPr>
@@ -3975,7 +3975,7 @@
           <p:cNvPr id="2" name="Date Placeholder 1">
             <a:extLst>
               <a:ext uri="{FF2B5EF4-FFF2-40B4-BE49-F238E27FC236}">
-                <a16:creationId xmlns:a16="http://schemas.microsoft.com/office/drawing/2014/main" id="{839983C1-41F3-4B45-9E6B-F2615F743C0A}"/>
+                <a16:creationId xmlns:a16="http://schemas.microsoft.com/office/drawing/2014/main" xmlns="" id="{839983C1-41F3-4B45-9E6B-F2615F743C0A}"/>
               </a:ext>
             </a:extLst>
           </p:cNvPr>
@@ -3994,7 +3994,7 @@
             <a:fld id="{055373AC-9AA7-423B-BA00-BA1C74164DBD}" type="datetime1">
               <a:rPr lang="en-US" smtClean="0"/>
               <a:pPr/>
-              <a:t>11/11/2019</a:t>
+              <a:t>11/21/2019</a:t>
             </a:fld>
             <a:endParaRPr lang="en-US" dirty="0"/>
           </a:p>
@@ -4005,7 +4005,7 @@
           <p:cNvPr id="6" name="Footer Placeholder 5">
             <a:extLst>
               <a:ext uri="{FF2B5EF4-FFF2-40B4-BE49-F238E27FC236}">
-                <a16:creationId xmlns:a16="http://schemas.microsoft.com/office/drawing/2014/main" id="{A32622C9-3C7D-445D-83B2-28583716E287}"/>
+                <a16:creationId xmlns:a16="http://schemas.microsoft.com/office/drawing/2014/main" xmlns="" id="{A32622C9-3C7D-445D-83B2-28583716E287}"/>
               </a:ext>
             </a:extLst>
           </p:cNvPr>
@@ -4030,7 +4030,7 @@
           <p:cNvPr id="7" name="Slide Number Placeholder 6">
             <a:extLst>
               <a:ext uri="{FF2B5EF4-FFF2-40B4-BE49-F238E27FC236}">
-                <a16:creationId xmlns:a16="http://schemas.microsoft.com/office/drawing/2014/main" id="{2404DAB2-278F-4812-9F5E-FB63D8068383}"/>
+                <a16:creationId xmlns:a16="http://schemas.microsoft.com/office/drawing/2014/main" xmlns="" id="{2404DAB2-278F-4812-9F5E-FB63D8068383}"/>
               </a:ext>
             </a:extLst>
           </p:cNvPr>
@@ -4060,7 +4060,7 @@
           <p:cNvPr id="18" name="Picture 17">
             <a:extLst>
               <a:ext uri="{FF2B5EF4-FFF2-40B4-BE49-F238E27FC236}">
-                <a16:creationId xmlns:a16="http://schemas.microsoft.com/office/drawing/2014/main" id="{A0675455-B7FA-4569-A5FD-A3B0F20B2A26}"/>
+                <a16:creationId xmlns:a16="http://schemas.microsoft.com/office/drawing/2014/main" xmlns="" id="{A0675455-B7FA-4569-A5FD-A3B0F20B2A26}"/>
               </a:ext>
             </a:extLst>
           </p:cNvPr>
@@ -4096,7 +4096,7 @@
           <p:cNvPr id="20" name="Picture 19">
             <a:extLst>
               <a:ext uri="{FF2B5EF4-FFF2-40B4-BE49-F238E27FC236}">
-                <a16:creationId xmlns:a16="http://schemas.microsoft.com/office/drawing/2014/main" id="{827D15FD-4C66-4B85-98E6-7826AA8F61C6}"/>
+                <a16:creationId xmlns:a16="http://schemas.microsoft.com/office/drawing/2014/main" xmlns="" id="{827D15FD-4C66-4B85-98E6-7826AA8F61C6}"/>
               </a:ext>
             </a:extLst>
           </p:cNvPr>
@@ -4132,7 +4132,7 @@
           <p:cNvPr id="21" name="Picture 20">
             <a:extLst>
               <a:ext uri="{FF2B5EF4-FFF2-40B4-BE49-F238E27FC236}">
-                <a16:creationId xmlns:a16="http://schemas.microsoft.com/office/drawing/2014/main" id="{EA755AAE-BA08-481C-9224-0061170EE4B8}"/>
+                <a16:creationId xmlns:a16="http://schemas.microsoft.com/office/drawing/2014/main" xmlns="" id="{EA755AAE-BA08-481C-9224-0061170EE4B8}"/>
               </a:ext>
             </a:extLst>
           </p:cNvPr>
@@ -4168,7 +4168,7 @@
           <p:cNvPr id="22" name="Picture 21">
             <a:extLst>
               <a:ext uri="{FF2B5EF4-FFF2-40B4-BE49-F238E27FC236}">
-                <a16:creationId xmlns:a16="http://schemas.microsoft.com/office/drawing/2014/main" id="{0A83D66F-855B-463B-920B-BF239B01A206}"/>
+                <a16:creationId xmlns:a16="http://schemas.microsoft.com/office/drawing/2014/main" xmlns="" id="{0A83D66F-855B-463B-920B-BF239B01A206}"/>
               </a:ext>
             </a:extLst>
           </p:cNvPr>
@@ -4204,7 +4204,7 @@
           <p:cNvPr id="23" name="Picture 22">
             <a:extLst>
               <a:ext uri="{FF2B5EF4-FFF2-40B4-BE49-F238E27FC236}">
-                <a16:creationId xmlns:a16="http://schemas.microsoft.com/office/drawing/2014/main" id="{6643F71A-2013-433A-8322-FBAAED3162D8}"/>
+                <a16:creationId xmlns:a16="http://schemas.microsoft.com/office/drawing/2014/main" xmlns="" id="{6643F71A-2013-433A-8322-FBAAED3162D8}"/>
               </a:ext>
             </a:extLst>
           </p:cNvPr>
@@ -4240,7 +4240,7 @@
           <p:cNvPr id="24" name="Picture 23">
             <a:extLst>
               <a:ext uri="{FF2B5EF4-FFF2-40B4-BE49-F238E27FC236}">
-                <a16:creationId xmlns:a16="http://schemas.microsoft.com/office/drawing/2014/main" id="{B0812936-74B6-4265-8C08-AEDC8C798702}"/>
+                <a16:creationId xmlns:a16="http://schemas.microsoft.com/office/drawing/2014/main" xmlns="" id="{B0812936-74B6-4265-8C08-AEDC8C798702}"/>
               </a:ext>
             </a:extLst>
           </p:cNvPr>
@@ -4276,7 +4276,7 @@
           <p:cNvPr id="25" name="Picture 24">
             <a:extLst>
               <a:ext uri="{FF2B5EF4-FFF2-40B4-BE49-F238E27FC236}">
-                <a16:creationId xmlns:a16="http://schemas.microsoft.com/office/drawing/2014/main" id="{C74C190C-5856-41B9-8819-AE8DE0E10980}"/>
+                <a16:creationId xmlns:a16="http://schemas.microsoft.com/office/drawing/2014/main" xmlns="" id="{C74C190C-5856-41B9-8819-AE8DE0E10980}"/>
               </a:ext>
             </a:extLst>
           </p:cNvPr>
@@ -4312,7 +4312,7 @@
           <p:cNvPr id="27" name="Straight Connector 26">
             <a:extLst>
               <a:ext uri="{FF2B5EF4-FFF2-40B4-BE49-F238E27FC236}">
-                <a16:creationId xmlns:a16="http://schemas.microsoft.com/office/drawing/2014/main" id="{5F62FB7C-BD6E-4383-98C1-2CF30F34CAFD}"/>
+                <a16:creationId xmlns:a16="http://schemas.microsoft.com/office/drawing/2014/main" xmlns="" id="{5F62FB7C-BD6E-4383-98C1-2CF30F34CAFD}"/>
               </a:ext>
             </a:extLst>
           </p:cNvPr>
@@ -4351,7 +4351,7 @@
           <p:cNvPr id="28" name="Straight Connector 27">
             <a:extLst>
               <a:ext uri="{FF2B5EF4-FFF2-40B4-BE49-F238E27FC236}">
-                <a16:creationId xmlns:a16="http://schemas.microsoft.com/office/drawing/2014/main" id="{D4E5982E-3110-47E1-A5BB-91B7BECC3093}"/>
+                <a16:creationId xmlns:a16="http://schemas.microsoft.com/office/drawing/2014/main" xmlns="" id="{D4E5982E-3110-47E1-A5BB-91B7BECC3093}"/>
               </a:ext>
             </a:extLst>
           </p:cNvPr>
@@ -4388,7 +4388,7 @@
           <p:cNvPr id="29" name="Straight Connector 28">
             <a:extLst>
               <a:ext uri="{FF2B5EF4-FFF2-40B4-BE49-F238E27FC236}">
-                <a16:creationId xmlns:a16="http://schemas.microsoft.com/office/drawing/2014/main" id="{72BFE2F3-0845-4E5B-9375-E9D4027DD675}"/>
+                <a16:creationId xmlns:a16="http://schemas.microsoft.com/office/drawing/2014/main" xmlns="" id="{72BFE2F3-0845-4E5B-9375-E9D4027DD675}"/>
               </a:ext>
             </a:extLst>
           </p:cNvPr>
@@ -4425,7 +4425,7 @@
           <p:cNvPr id="30" name="Straight Connector 29">
             <a:extLst>
               <a:ext uri="{FF2B5EF4-FFF2-40B4-BE49-F238E27FC236}">
-                <a16:creationId xmlns:a16="http://schemas.microsoft.com/office/drawing/2014/main" id="{93DDBF37-0764-47AA-94E3-9A44F3ED8FB5}"/>
+                <a16:creationId xmlns:a16="http://schemas.microsoft.com/office/drawing/2014/main" xmlns="" id="{93DDBF37-0764-47AA-94E3-9A44F3ED8FB5}"/>
               </a:ext>
             </a:extLst>
           </p:cNvPr>
@@ -4462,7 +4462,7 @@
           <p:cNvPr id="31" name="Straight Connector 30">
             <a:extLst>
               <a:ext uri="{FF2B5EF4-FFF2-40B4-BE49-F238E27FC236}">
-                <a16:creationId xmlns:a16="http://schemas.microsoft.com/office/drawing/2014/main" id="{299ABE09-E33C-46B7-A80D-7BF4A6956211}"/>
+                <a16:creationId xmlns:a16="http://schemas.microsoft.com/office/drawing/2014/main" xmlns="" id="{299ABE09-E33C-46B7-A80D-7BF4A6956211}"/>
               </a:ext>
             </a:extLst>
           </p:cNvPr>
@@ -4499,7 +4499,7 @@
           <p:cNvPr id="32" name="Straight Connector 31">
             <a:extLst>
               <a:ext uri="{FF2B5EF4-FFF2-40B4-BE49-F238E27FC236}">
-                <a16:creationId xmlns:a16="http://schemas.microsoft.com/office/drawing/2014/main" id="{6E91D320-3732-40B8-864D-142D0A277ED1}"/>
+                <a16:creationId xmlns:a16="http://schemas.microsoft.com/office/drawing/2014/main" xmlns="" id="{6E91D320-3732-40B8-864D-142D0A277ED1}"/>
               </a:ext>
             </a:extLst>
           </p:cNvPr>
@@ -4538,7 +4538,7 @@
           <p:cNvPr id="33" name="Straight Connector 32">
             <a:extLst>
               <a:ext uri="{FF2B5EF4-FFF2-40B4-BE49-F238E27FC236}">
-                <a16:creationId xmlns:a16="http://schemas.microsoft.com/office/drawing/2014/main" id="{5C63D1E8-4A92-4691-8A24-A2FC7E8008E5}"/>
+                <a16:creationId xmlns:a16="http://schemas.microsoft.com/office/drawing/2014/main" xmlns="" id="{5C63D1E8-4A92-4691-8A24-A2FC7E8008E5}"/>
               </a:ext>
             </a:extLst>
           </p:cNvPr>
@@ -4577,7 +4577,7 @@
           <p:cNvPr id="34" name="Straight Connector 33">
             <a:extLst>
               <a:ext uri="{FF2B5EF4-FFF2-40B4-BE49-F238E27FC236}">
-                <a16:creationId xmlns:a16="http://schemas.microsoft.com/office/drawing/2014/main" id="{C84A0FE1-723D-4682-8682-77BAD950EE15}"/>
+                <a16:creationId xmlns:a16="http://schemas.microsoft.com/office/drawing/2014/main" xmlns="" id="{C84A0FE1-723D-4682-8682-77BAD950EE15}"/>
               </a:ext>
             </a:extLst>
           </p:cNvPr>
@@ -4614,7 +4614,7 @@
           <p:cNvPr id="35" name="Rectangle 34">
             <a:extLst>
               <a:ext uri="{FF2B5EF4-FFF2-40B4-BE49-F238E27FC236}">
-                <a16:creationId xmlns:a16="http://schemas.microsoft.com/office/drawing/2014/main" id="{550A59F9-9A9D-4956-95B4-F78CC0DB1D59}"/>
+                <a16:creationId xmlns:a16="http://schemas.microsoft.com/office/drawing/2014/main" xmlns="" id="{550A59F9-9A9D-4956-95B4-F78CC0DB1D59}"/>
               </a:ext>
             </a:extLst>
           </p:cNvPr>
@@ -4695,7 +4695,7 @@
           <p:cNvPr id="37" name="Picture 36">
             <a:extLst>
               <a:ext uri="{FF2B5EF4-FFF2-40B4-BE49-F238E27FC236}">
-                <a16:creationId xmlns:a16="http://schemas.microsoft.com/office/drawing/2014/main" id="{8AF69835-F228-45D6-B39E-583EEBF1FE2D}"/>
+                <a16:creationId xmlns:a16="http://schemas.microsoft.com/office/drawing/2014/main" xmlns="" id="{8AF69835-F228-45D6-B39E-583EEBF1FE2D}"/>
               </a:ext>
             </a:extLst>
           </p:cNvPr>
@@ -4705,7 +4705,7 @@
           <p:nvPr userDrawn="1"/>
         </p:nvPicPr>
         <p:blipFill>
-          <a:blip r:embed="rId5">
+          <a:blip r:embed="rId5" cstate="print">
             <a:extLst>
               <a:ext uri="{28A0092B-C50C-407E-A947-70E740481C1C}">
                 <a14:useLocalDpi xmlns:a14="http://schemas.microsoft.com/office/drawing/2010/main" val="0"/>
@@ -4731,7 +4731,7 @@
           <p:cNvPr id="38" name="Picture 37">
             <a:extLst>
               <a:ext uri="{FF2B5EF4-FFF2-40B4-BE49-F238E27FC236}">
-                <a16:creationId xmlns:a16="http://schemas.microsoft.com/office/drawing/2014/main" id="{0577C4C0-8539-4520-A497-BBFB45821D24}"/>
+                <a16:creationId xmlns:a16="http://schemas.microsoft.com/office/drawing/2014/main" xmlns="" id="{0577C4C0-8539-4520-A497-BBFB45821D24}"/>
               </a:ext>
             </a:extLst>
           </p:cNvPr>
@@ -4767,7 +4767,7 @@
           <p:cNvPr id="39" name="Picture 38">
             <a:extLst>
               <a:ext uri="{FF2B5EF4-FFF2-40B4-BE49-F238E27FC236}">
-                <a16:creationId xmlns:a16="http://schemas.microsoft.com/office/drawing/2014/main" id="{16073A22-1B90-4D35-943B-5D9816FEB8FE}"/>
+                <a16:creationId xmlns:a16="http://schemas.microsoft.com/office/drawing/2014/main" xmlns="" id="{16073A22-1B90-4D35-943B-5D9816FEB8FE}"/>
               </a:ext>
             </a:extLst>
           </p:cNvPr>
@@ -4777,7 +4777,7 @@
           <p:nvPr userDrawn="1"/>
         </p:nvPicPr>
         <p:blipFill>
-          <a:blip r:embed="rId12" cstate="hqprint">
+          <a:blip r:embed="rId12" cstate="print">
             <a:extLst>
               <a:ext uri="{28A0092B-C50C-407E-A947-70E740481C1C}">
                 <a14:useLocalDpi xmlns:a14="http://schemas.microsoft.com/office/drawing/2010/main" val="0"/>
@@ -4803,7 +4803,7 @@
           <p:cNvPr id="40" name="Picture 39">
             <a:extLst>
               <a:ext uri="{FF2B5EF4-FFF2-40B4-BE49-F238E27FC236}">
-                <a16:creationId xmlns:a16="http://schemas.microsoft.com/office/drawing/2014/main" id="{F7C8CFEA-27DA-4058-A611-3AE53851908C}"/>
+                <a16:creationId xmlns:a16="http://schemas.microsoft.com/office/drawing/2014/main" xmlns="" id="{F7C8CFEA-27DA-4058-A611-3AE53851908C}"/>
               </a:ext>
             </a:extLst>
           </p:cNvPr>
@@ -4813,7 +4813,7 @@
           <p:nvPr userDrawn="1"/>
         </p:nvPicPr>
         <p:blipFill>
-          <a:blip r:embed="rId13" cstate="hqprint">
+          <a:blip r:embed="rId13" cstate="print">
             <a:extLst>
               <a:ext uri="{28A0092B-C50C-407E-A947-70E740481C1C}">
                 <a14:useLocalDpi xmlns:a14="http://schemas.microsoft.com/office/drawing/2010/main" val="0"/>
@@ -4839,7 +4839,7 @@
           <p:cNvPr id="41" name="Picture 40">
             <a:extLst>
               <a:ext uri="{FF2B5EF4-FFF2-40B4-BE49-F238E27FC236}">
-                <a16:creationId xmlns:a16="http://schemas.microsoft.com/office/drawing/2014/main" id="{CE9346DD-5152-48D0-8B06-7F8CE9803DAB}"/>
+                <a16:creationId xmlns:a16="http://schemas.microsoft.com/office/drawing/2014/main" xmlns="" id="{CE9346DD-5152-48D0-8B06-7F8CE9803DAB}"/>
               </a:ext>
             </a:extLst>
           </p:cNvPr>
@@ -4849,7 +4849,7 @@
           <p:nvPr userDrawn="1"/>
         </p:nvPicPr>
         <p:blipFill>
-          <a:blip r:embed="rId14" cstate="hqprint">
+          <a:blip r:embed="rId14" cstate="print">
             <a:extLst>
               <a:ext uri="{28A0092B-C50C-407E-A947-70E740481C1C}">
                 <a14:useLocalDpi xmlns:a14="http://schemas.microsoft.com/office/drawing/2010/main" val="0"/>
@@ -4875,7 +4875,7 @@
           <p:cNvPr id="43" name="Picture 42">
             <a:extLst>
               <a:ext uri="{FF2B5EF4-FFF2-40B4-BE49-F238E27FC236}">
-                <a16:creationId xmlns:a16="http://schemas.microsoft.com/office/drawing/2014/main" id="{F6B4B602-D2C7-47C8-9470-2C5795ED8C22}"/>
+                <a16:creationId xmlns:a16="http://schemas.microsoft.com/office/drawing/2014/main" xmlns="" id="{F6B4B602-D2C7-47C8-9470-2C5795ED8C22}"/>
               </a:ext>
             </a:extLst>
           </p:cNvPr>
@@ -4885,7 +4885,7 @@
           <p:nvPr userDrawn="1"/>
         </p:nvPicPr>
         <p:blipFill>
-          <a:blip r:embed="rId15" cstate="hqprint">
+          <a:blip r:embed="rId15" cstate="print">
             <a:extLst>
               <a:ext uri="{28A0092B-C50C-407E-A947-70E740481C1C}">
                 <a14:useLocalDpi xmlns:a14="http://schemas.microsoft.com/office/drawing/2010/main" val="0"/>
@@ -4911,7 +4911,7 @@
           <p:cNvPr id="44" name="Picture 43">
             <a:extLst>
               <a:ext uri="{FF2B5EF4-FFF2-40B4-BE49-F238E27FC236}">
-                <a16:creationId xmlns:a16="http://schemas.microsoft.com/office/drawing/2014/main" id="{103B7E6D-AFDD-45E1-8121-F42E465AB0E8}"/>
+                <a16:creationId xmlns:a16="http://schemas.microsoft.com/office/drawing/2014/main" xmlns="" id="{103B7E6D-AFDD-45E1-8121-F42E465AB0E8}"/>
               </a:ext>
             </a:extLst>
           </p:cNvPr>
@@ -4921,7 +4921,7 @@
           <p:nvPr userDrawn="1"/>
         </p:nvPicPr>
         <p:blipFill>
-          <a:blip r:embed="rId16" cstate="hqprint">
+          <a:blip r:embed="rId16" cstate="print">
             <a:extLst>
               <a:ext uri="{28A0092B-C50C-407E-A947-70E740481C1C}">
                 <a14:useLocalDpi xmlns:a14="http://schemas.microsoft.com/office/drawing/2010/main" val="0"/>
@@ -4947,7 +4947,7 @@
           <p:cNvPr id="45" name="Straight Connector 44">
             <a:extLst>
               <a:ext uri="{FF2B5EF4-FFF2-40B4-BE49-F238E27FC236}">
-                <a16:creationId xmlns:a16="http://schemas.microsoft.com/office/drawing/2014/main" id="{5FA3191E-14EF-4DC3-AD93-CA289B12B4C9}"/>
+                <a16:creationId xmlns:a16="http://schemas.microsoft.com/office/drawing/2014/main" xmlns="" id="{5FA3191E-14EF-4DC3-AD93-CA289B12B4C9}"/>
               </a:ext>
             </a:extLst>
           </p:cNvPr>
@@ -4986,7 +4986,7 @@
           <p:cNvPr id="46" name="Straight Connector 45">
             <a:extLst>
               <a:ext uri="{FF2B5EF4-FFF2-40B4-BE49-F238E27FC236}">
-                <a16:creationId xmlns:a16="http://schemas.microsoft.com/office/drawing/2014/main" id="{AB530A8A-ABDE-4B7F-B28B-A9B499B32225}"/>
+                <a16:creationId xmlns:a16="http://schemas.microsoft.com/office/drawing/2014/main" xmlns="" id="{AB530A8A-ABDE-4B7F-B28B-A9B499B32225}"/>
               </a:ext>
             </a:extLst>
           </p:cNvPr>
@@ -5023,7 +5023,7 @@
           <p:cNvPr id="47" name="Straight Connector 46">
             <a:extLst>
               <a:ext uri="{FF2B5EF4-FFF2-40B4-BE49-F238E27FC236}">
-                <a16:creationId xmlns:a16="http://schemas.microsoft.com/office/drawing/2014/main" id="{E5ADF575-91AD-4F69-BA66-356B62AEB683}"/>
+                <a16:creationId xmlns:a16="http://schemas.microsoft.com/office/drawing/2014/main" xmlns="" id="{E5ADF575-91AD-4F69-BA66-356B62AEB683}"/>
               </a:ext>
             </a:extLst>
           </p:cNvPr>
@@ -5060,7 +5060,7 @@
           <p:cNvPr id="48" name="Straight Connector 47">
             <a:extLst>
               <a:ext uri="{FF2B5EF4-FFF2-40B4-BE49-F238E27FC236}">
-                <a16:creationId xmlns:a16="http://schemas.microsoft.com/office/drawing/2014/main" id="{D60C0104-2410-4352-A800-FD0292CC11A7}"/>
+                <a16:creationId xmlns:a16="http://schemas.microsoft.com/office/drawing/2014/main" xmlns="" id="{D60C0104-2410-4352-A800-FD0292CC11A7}"/>
               </a:ext>
             </a:extLst>
           </p:cNvPr>
@@ -5097,7 +5097,7 @@
           <p:cNvPr id="49" name="Straight Connector 48">
             <a:extLst>
               <a:ext uri="{FF2B5EF4-FFF2-40B4-BE49-F238E27FC236}">
-                <a16:creationId xmlns:a16="http://schemas.microsoft.com/office/drawing/2014/main" id="{10FB7F08-6662-4D0C-AFAB-CFFDE9B1CA0A}"/>
+                <a16:creationId xmlns:a16="http://schemas.microsoft.com/office/drawing/2014/main" xmlns="" id="{10FB7F08-6662-4D0C-AFAB-CFFDE9B1CA0A}"/>
               </a:ext>
             </a:extLst>
           </p:cNvPr>
@@ -5134,7 +5134,7 @@
           <p:cNvPr id="50" name="Straight Connector 49">
             <a:extLst>
               <a:ext uri="{FF2B5EF4-FFF2-40B4-BE49-F238E27FC236}">
-                <a16:creationId xmlns:a16="http://schemas.microsoft.com/office/drawing/2014/main" id="{379635D4-E3FF-4174-A648-032E9615851B}"/>
+                <a16:creationId xmlns:a16="http://schemas.microsoft.com/office/drawing/2014/main" xmlns="" id="{379635D4-E3FF-4174-A648-032E9615851B}"/>
               </a:ext>
             </a:extLst>
           </p:cNvPr>
@@ -5173,7 +5173,7 @@
           <p:cNvPr id="51" name="Straight Connector 50">
             <a:extLst>
               <a:ext uri="{FF2B5EF4-FFF2-40B4-BE49-F238E27FC236}">
-                <a16:creationId xmlns:a16="http://schemas.microsoft.com/office/drawing/2014/main" id="{0601A2EF-9181-444B-8898-83A36D09B869}"/>
+                <a16:creationId xmlns:a16="http://schemas.microsoft.com/office/drawing/2014/main" xmlns="" id="{0601A2EF-9181-444B-8898-83A36D09B869}"/>
               </a:ext>
             </a:extLst>
           </p:cNvPr>
@@ -5212,7 +5212,7 @@
           <p:cNvPr id="52" name="Straight Connector 51">
             <a:extLst>
               <a:ext uri="{FF2B5EF4-FFF2-40B4-BE49-F238E27FC236}">
-                <a16:creationId xmlns:a16="http://schemas.microsoft.com/office/drawing/2014/main" id="{307F38C1-A87B-4D59-BE69-6A23413F5870}"/>
+                <a16:creationId xmlns:a16="http://schemas.microsoft.com/office/drawing/2014/main" xmlns="" id="{307F38C1-A87B-4D59-BE69-6A23413F5870}"/>
               </a:ext>
             </a:extLst>
           </p:cNvPr>
@@ -5265,7 +5265,7 @@
   <p:hf hdr="0" ftr="0" dt="0"/>
   <p:extLst mod="1">
     <p:ext uri="{DCECCB84-F9BA-43D5-87BE-67443E8EF086}">
-      <p15:sldGuideLst xmlns:p15="http://schemas.microsoft.com/office/powerpoint/2012/main">
+      <p15:sldGuideLst xmlns:p15="http://schemas.microsoft.com/office/powerpoint/2012/main" xmlns="">
         <p15:guide id="1" orient="horz" pos="2160">
           <p15:clr>
             <a:srgbClr val="FBAE40"/>
@@ -5304,7 +5304,7 @@
           <p:cNvPr id="13" name="Picture 12">
             <a:extLst>
               <a:ext uri="{FF2B5EF4-FFF2-40B4-BE49-F238E27FC236}">
-                <a16:creationId xmlns:a16="http://schemas.microsoft.com/office/drawing/2014/main" id="{C00C2D88-4D3E-4C4B-AFD7-B7EA2768B8F5}"/>
+                <a16:creationId xmlns:a16="http://schemas.microsoft.com/office/drawing/2014/main" xmlns="" id="{C00C2D88-4D3E-4C4B-AFD7-B7EA2768B8F5}"/>
               </a:ext>
             </a:extLst>
           </p:cNvPr>
@@ -5333,7 +5333,7 @@
           <p:cNvPr id="3" name="Date Placeholder 2">
             <a:extLst>
               <a:ext uri="{FF2B5EF4-FFF2-40B4-BE49-F238E27FC236}">
-                <a16:creationId xmlns:a16="http://schemas.microsoft.com/office/drawing/2014/main" id="{FAA51FC5-6AB6-4A04-9304-C6C88E9B29FA}"/>
+                <a16:creationId xmlns:a16="http://schemas.microsoft.com/office/drawing/2014/main" xmlns="" id="{FAA51FC5-6AB6-4A04-9304-C6C88E9B29FA}"/>
               </a:ext>
             </a:extLst>
           </p:cNvPr>
@@ -5352,7 +5352,7 @@
             <a:fld id="{055373AC-9AA7-423B-BA00-BA1C74164DBD}" type="datetime1">
               <a:rPr lang="en-US" smtClean="0"/>
               <a:pPr/>
-              <a:t>11/11/2019</a:t>
+              <a:t>11/21/2019</a:t>
             </a:fld>
             <a:endParaRPr lang="en-US" dirty="0"/>
           </a:p>
@@ -5363,7 +5363,7 @@
           <p:cNvPr id="4" name="Footer Placeholder 3">
             <a:extLst>
               <a:ext uri="{FF2B5EF4-FFF2-40B4-BE49-F238E27FC236}">
-                <a16:creationId xmlns:a16="http://schemas.microsoft.com/office/drawing/2014/main" id="{75D83D18-FDC7-4C48-A949-71D2969C594A}"/>
+                <a16:creationId xmlns:a16="http://schemas.microsoft.com/office/drawing/2014/main" xmlns="" id="{75D83D18-FDC7-4C48-A949-71D2969C594A}"/>
               </a:ext>
             </a:extLst>
           </p:cNvPr>
@@ -5388,7 +5388,7 @@
           <p:cNvPr id="5" name="Slide Number Placeholder 4">
             <a:extLst>
               <a:ext uri="{FF2B5EF4-FFF2-40B4-BE49-F238E27FC236}">
-                <a16:creationId xmlns:a16="http://schemas.microsoft.com/office/drawing/2014/main" id="{6AFAD92E-A653-4789-B55D-8A2181002B59}"/>
+                <a16:creationId xmlns:a16="http://schemas.microsoft.com/office/drawing/2014/main" xmlns="" id="{6AFAD92E-A653-4789-B55D-8A2181002B59}"/>
               </a:ext>
             </a:extLst>
           </p:cNvPr>
@@ -5419,7 +5419,7 @@
             <a:hlinkClick r:id="rId3"/>
             <a:extLst>
               <a:ext uri="{FF2B5EF4-FFF2-40B4-BE49-F238E27FC236}">
-                <a16:creationId xmlns:a16="http://schemas.microsoft.com/office/drawing/2014/main" id="{7C54483B-C622-499B-BAE8-467BFD3E1080}"/>
+                <a16:creationId xmlns:a16="http://schemas.microsoft.com/office/drawing/2014/main" xmlns="" id="{7C54483B-C622-499B-BAE8-467BFD3E1080}"/>
               </a:ext>
             </a:extLst>
           </p:cNvPr>
@@ -5458,7 +5458,7 @@
             <a:hlinkClick r:id="rId5"/>
             <a:extLst>
               <a:ext uri="{FF2B5EF4-FFF2-40B4-BE49-F238E27FC236}">
-                <a16:creationId xmlns:a16="http://schemas.microsoft.com/office/drawing/2014/main" id="{7AF9BEA8-CB87-4D39-873A-4E7E04D46685}"/>
+                <a16:creationId xmlns:a16="http://schemas.microsoft.com/office/drawing/2014/main" xmlns="" id="{7AF9BEA8-CB87-4D39-873A-4E7E04D46685}"/>
               </a:ext>
             </a:extLst>
           </p:cNvPr>
@@ -5497,7 +5497,7 @@
             <a:hlinkClick r:id="rId7"/>
             <a:extLst>
               <a:ext uri="{FF2B5EF4-FFF2-40B4-BE49-F238E27FC236}">
-                <a16:creationId xmlns:a16="http://schemas.microsoft.com/office/drawing/2014/main" id="{7DFD3364-5D9B-4B91-B09C-8540E820560A}"/>
+                <a16:creationId xmlns:a16="http://schemas.microsoft.com/office/drawing/2014/main" xmlns="" id="{7DFD3364-5D9B-4B91-B09C-8540E820560A}"/>
               </a:ext>
             </a:extLst>
           </p:cNvPr>
@@ -5536,7 +5536,7 @@
             <a:hlinkClick r:id="rId9"/>
             <a:extLst>
               <a:ext uri="{FF2B5EF4-FFF2-40B4-BE49-F238E27FC236}">
-                <a16:creationId xmlns:a16="http://schemas.microsoft.com/office/drawing/2014/main" id="{F0386401-29A7-4448-AB68-1289BA211F55}"/>
+                <a16:creationId xmlns:a16="http://schemas.microsoft.com/office/drawing/2014/main" xmlns="" id="{F0386401-29A7-4448-AB68-1289BA211F55}"/>
               </a:ext>
             </a:extLst>
           </p:cNvPr>
@@ -5574,7 +5574,7 @@
             <a:hlinkClick r:id="rId11"/>
             <a:extLst>
               <a:ext uri="{FF2B5EF4-FFF2-40B4-BE49-F238E27FC236}">
-                <a16:creationId xmlns:a16="http://schemas.microsoft.com/office/drawing/2014/main" id="{CDC9F208-E4B0-4626-BBAD-F54DFF0CF9B5}"/>
+                <a16:creationId xmlns:a16="http://schemas.microsoft.com/office/drawing/2014/main" xmlns="" id="{CDC9F208-E4B0-4626-BBAD-F54DFF0CF9B5}"/>
               </a:ext>
             </a:extLst>
           </p:cNvPr>
@@ -5613,7 +5613,7 @@
             <a:hlinkClick r:id="rId13"/>
             <a:extLst>
               <a:ext uri="{FF2B5EF4-FFF2-40B4-BE49-F238E27FC236}">
-                <a16:creationId xmlns:a16="http://schemas.microsoft.com/office/drawing/2014/main" id="{1DE8CA65-1470-4A40-9B49-AFF7E19C21A0}"/>
+                <a16:creationId xmlns:a16="http://schemas.microsoft.com/office/drawing/2014/main" xmlns="" id="{1DE8CA65-1470-4A40-9B49-AFF7E19C21A0}"/>
               </a:ext>
             </a:extLst>
           </p:cNvPr>
@@ -5651,7 +5651,7 @@
           <p:cNvPr id="14" name="Rectangle 13">
             <a:extLst>
               <a:ext uri="{FF2B5EF4-FFF2-40B4-BE49-F238E27FC236}">
-                <a16:creationId xmlns:a16="http://schemas.microsoft.com/office/drawing/2014/main" id="{26991FD8-5C91-4C3D-9F00-7203C811B463}"/>
+                <a16:creationId xmlns:a16="http://schemas.microsoft.com/office/drawing/2014/main" xmlns="" id="{26991FD8-5C91-4C3D-9F00-7203C811B463}"/>
               </a:ext>
             </a:extLst>
           </p:cNvPr>
@@ -5732,7 +5732,7 @@
           <p:cNvPr id="2" name="Title 1">
             <a:extLst>
               <a:ext uri="{FF2B5EF4-FFF2-40B4-BE49-F238E27FC236}">
-                <a16:creationId xmlns:a16="http://schemas.microsoft.com/office/drawing/2014/main" id="{239E3AAC-161E-41EF-A701-E46A497FCC37}"/>
+                <a16:creationId xmlns:a16="http://schemas.microsoft.com/office/drawing/2014/main" xmlns="" id="{239E3AAC-161E-41EF-A701-E46A497FCC37}"/>
               </a:ext>
             </a:extLst>
           </p:cNvPr>
@@ -5778,7 +5778,7 @@
           <p:cNvPr id="15" name="Picture 14">
             <a:extLst>
               <a:ext uri="{FF2B5EF4-FFF2-40B4-BE49-F238E27FC236}">
-                <a16:creationId xmlns:a16="http://schemas.microsoft.com/office/drawing/2014/main" id="{3F691F48-DCAC-4489-AA09-7346B7E67855}"/>
+                <a16:creationId xmlns:a16="http://schemas.microsoft.com/office/drawing/2014/main" xmlns="" id="{3F691F48-DCAC-4489-AA09-7346B7E67855}"/>
               </a:ext>
             </a:extLst>
           </p:cNvPr>
@@ -5852,7 +5852,7 @@
           <p:cNvPr id="13" name="Picture 12">
             <a:extLst>
               <a:ext uri="{FF2B5EF4-FFF2-40B4-BE49-F238E27FC236}">
-                <a16:creationId xmlns:a16="http://schemas.microsoft.com/office/drawing/2014/main" id="{C00C2D88-4D3E-4C4B-AFD7-B7EA2768B8F5}"/>
+                <a16:creationId xmlns:a16="http://schemas.microsoft.com/office/drawing/2014/main" xmlns="" id="{C00C2D88-4D3E-4C4B-AFD7-B7EA2768B8F5}"/>
               </a:ext>
             </a:extLst>
           </p:cNvPr>
@@ -5881,7 +5881,7 @@
           <p:cNvPr id="14" name="Rectangle 13">
             <a:extLst>
               <a:ext uri="{FF2B5EF4-FFF2-40B4-BE49-F238E27FC236}">
-                <a16:creationId xmlns:a16="http://schemas.microsoft.com/office/drawing/2014/main" id="{26991FD8-5C91-4C3D-9F00-7203C811B463}"/>
+                <a16:creationId xmlns:a16="http://schemas.microsoft.com/office/drawing/2014/main" xmlns="" id="{26991FD8-5C91-4C3D-9F00-7203C811B463}"/>
               </a:ext>
             </a:extLst>
           </p:cNvPr>
@@ -5962,7 +5962,7 @@
           <p:cNvPr id="2" name="Title 1">
             <a:extLst>
               <a:ext uri="{FF2B5EF4-FFF2-40B4-BE49-F238E27FC236}">
-                <a16:creationId xmlns:a16="http://schemas.microsoft.com/office/drawing/2014/main" id="{239E3AAC-161E-41EF-A701-E46A497FCC37}"/>
+                <a16:creationId xmlns:a16="http://schemas.microsoft.com/office/drawing/2014/main" xmlns="" id="{239E3AAC-161E-41EF-A701-E46A497FCC37}"/>
               </a:ext>
             </a:extLst>
           </p:cNvPr>
@@ -6009,7 +6009,7 @@
             <a:hlinkClick r:id="rId3"/>
             <a:extLst>
               <a:ext uri="{FF2B5EF4-FFF2-40B4-BE49-F238E27FC236}">
-                <a16:creationId xmlns:a16="http://schemas.microsoft.com/office/drawing/2014/main" id="{61839306-7842-46B9-A463-C24420A37C0A}"/>
+                <a16:creationId xmlns:a16="http://schemas.microsoft.com/office/drawing/2014/main" xmlns="" id="{61839306-7842-46B9-A463-C24420A37C0A}"/>
               </a:ext>
             </a:extLst>
           </p:cNvPr>
@@ -6053,7 +6053,7 @@
             <a:hlinkClick r:id="rId5"/>
             <a:extLst>
               <a:ext uri="{FF2B5EF4-FFF2-40B4-BE49-F238E27FC236}">
-                <a16:creationId xmlns:a16="http://schemas.microsoft.com/office/drawing/2014/main" id="{F5EB795D-0B62-4CCB-983D-13BD9B3CD0A5}"/>
+                <a16:creationId xmlns:a16="http://schemas.microsoft.com/office/drawing/2014/main" xmlns="" id="{F5EB795D-0B62-4CCB-983D-13BD9B3CD0A5}"/>
               </a:ext>
             </a:extLst>
           </p:cNvPr>
@@ -6101,7 +6101,7 @@
             <a:hlinkClick r:id="rId7"/>
             <a:extLst>
               <a:ext uri="{FF2B5EF4-FFF2-40B4-BE49-F238E27FC236}">
-                <a16:creationId xmlns:a16="http://schemas.microsoft.com/office/drawing/2014/main" id="{91C19F79-E05B-4929-A929-287F44EB3C94}"/>
+                <a16:creationId xmlns:a16="http://schemas.microsoft.com/office/drawing/2014/main" xmlns="" id="{91C19F79-E05B-4929-A929-287F44EB3C94}"/>
               </a:ext>
             </a:extLst>
           </p:cNvPr>
@@ -6149,7 +6149,7 @@
             <a:hlinkClick r:id="rId9"/>
             <a:extLst>
               <a:ext uri="{FF2B5EF4-FFF2-40B4-BE49-F238E27FC236}">
-                <a16:creationId xmlns:a16="http://schemas.microsoft.com/office/drawing/2014/main" id="{B38FBC35-D604-40D3-8560-90C506EBA728}"/>
+                <a16:creationId xmlns:a16="http://schemas.microsoft.com/office/drawing/2014/main" xmlns="" id="{B38FBC35-D604-40D3-8560-90C506EBA728}"/>
               </a:ext>
             </a:extLst>
           </p:cNvPr>
@@ -6195,7 +6195,7 @@
             <a:hlinkClick r:id="rId11"/>
             <a:extLst>
               <a:ext uri="{FF2B5EF4-FFF2-40B4-BE49-F238E27FC236}">
-                <a16:creationId xmlns:a16="http://schemas.microsoft.com/office/drawing/2014/main" id="{71103A5B-EAFD-46BF-93EB-10FFF58B7532}"/>
+                <a16:creationId xmlns:a16="http://schemas.microsoft.com/office/drawing/2014/main" xmlns="" id="{71103A5B-EAFD-46BF-93EB-10FFF58B7532}"/>
               </a:ext>
             </a:extLst>
           </p:cNvPr>
@@ -6243,7 +6243,7 @@
             <a:hlinkClick r:id="rId13"/>
             <a:extLst>
               <a:ext uri="{FF2B5EF4-FFF2-40B4-BE49-F238E27FC236}">
-                <a16:creationId xmlns:a16="http://schemas.microsoft.com/office/drawing/2014/main" id="{EDA50EFF-7A2E-4BB9-A7A8-5BBF9EE3DB69}"/>
+                <a16:creationId xmlns:a16="http://schemas.microsoft.com/office/drawing/2014/main" xmlns="" id="{EDA50EFF-7A2E-4BB9-A7A8-5BBF9EE3DB69}"/>
               </a:ext>
             </a:extLst>
           </p:cNvPr>
@@ -6290,7 +6290,7 @@
           <p:cNvPr id="21" name="Picture 20">
             <a:extLst>
               <a:ext uri="{FF2B5EF4-FFF2-40B4-BE49-F238E27FC236}">
-                <a16:creationId xmlns:a16="http://schemas.microsoft.com/office/drawing/2014/main" id="{31C8BF23-28B4-4942-902F-58C0B92A760B}"/>
+                <a16:creationId xmlns:a16="http://schemas.microsoft.com/office/drawing/2014/main" xmlns="" id="{31C8BF23-28B4-4942-902F-58C0B92A760B}"/>
               </a:ext>
             </a:extLst>
           </p:cNvPr>
@@ -6364,7 +6364,7 @@
           <p:cNvPr id="8" name="Picture 7">
             <a:extLst>
               <a:ext uri="{FF2B5EF4-FFF2-40B4-BE49-F238E27FC236}">
-                <a16:creationId xmlns:a16="http://schemas.microsoft.com/office/drawing/2014/main" id="{21DA41A3-0295-46DF-A320-41070D15EA50}"/>
+                <a16:creationId xmlns:a16="http://schemas.microsoft.com/office/drawing/2014/main" xmlns="" id="{21DA41A3-0295-46DF-A320-41070D15EA50}"/>
               </a:ext>
             </a:extLst>
           </p:cNvPr>
@@ -6393,7 +6393,7 @@
           <p:cNvPr id="12" name="Content Placeholder 3">
             <a:extLst>
               <a:ext uri="{FF2B5EF4-FFF2-40B4-BE49-F238E27FC236}">
-                <a16:creationId xmlns:a16="http://schemas.microsoft.com/office/drawing/2014/main" id="{0C1F9416-8B6E-46DE-973C-777785E27A26}"/>
+                <a16:creationId xmlns:a16="http://schemas.microsoft.com/office/drawing/2014/main" xmlns="" id="{0C1F9416-8B6E-46DE-973C-777785E27A26}"/>
               </a:ext>
             </a:extLst>
           </p:cNvPr>
@@ -6619,7 +6619,7 @@
             <a:hlinkClick r:id="rId7" tooltip="Software University @ Facebook"/>
             <a:extLst>
               <a:ext uri="{FF2B5EF4-FFF2-40B4-BE49-F238E27FC236}">
-                <a16:creationId xmlns:a16="http://schemas.microsoft.com/office/drawing/2014/main" id="{0101C673-F197-4525-ADDC-FFD181E4E167}"/>
+                <a16:creationId xmlns:a16="http://schemas.microsoft.com/office/drawing/2014/main" xmlns="" id="{0101C673-F197-4525-ADDC-FFD181E4E167}"/>
               </a:ext>
             </a:extLst>
           </p:cNvPr>
@@ -6629,7 +6629,7 @@
           <p:nvPr/>
         </p:nvPicPr>
         <p:blipFill>
-          <a:blip r:embed="rId8" cstate="hqprint">
+          <a:blip r:embed="rId8" cstate="print">
             <a:extLst>
               <a:ext uri="{28A0092B-C50C-407E-A947-70E740481C1C}">
                 <a14:useLocalDpi xmlns:a14="http://schemas.microsoft.com/office/drawing/2010/main" val="0"/>
@@ -6666,7 +6666,7 @@
             <a:hlinkClick r:id="rId6" tooltip="Software University Discussion Forum"/>
             <a:extLst>
               <a:ext uri="{FF2B5EF4-FFF2-40B4-BE49-F238E27FC236}">
-                <a16:creationId xmlns:a16="http://schemas.microsoft.com/office/drawing/2014/main" id="{A584039C-C3B0-4714-A6D0-181CA3D2DD26}"/>
+                <a16:creationId xmlns:a16="http://schemas.microsoft.com/office/drawing/2014/main" xmlns="" id="{A584039C-C3B0-4714-A6D0-181CA3D2DD26}"/>
               </a:ext>
             </a:extLst>
           </p:cNvPr>
@@ -6676,7 +6676,7 @@
           <p:nvPr/>
         </p:nvPicPr>
         <p:blipFill>
-          <a:blip r:embed="rId9" cstate="hqprint">
+          <a:blip r:embed="rId9" cstate="print">
             <a:extLst>
               <a:ext uri="{28A0092B-C50C-407E-A947-70E740481C1C}">
                 <a14:useLocalDpi xmlns:a14="http://schemas.microsoft.com/office/drawing/2010/main" val="0"/>
@@ -6703,7 +6703,7 @@
             <a:hlinkClick r:id="rId3"/>
             <a:extLst>
               <a:ext uri="{FF2B5EF4-FFF2-40B4-BE49-F238E27FC236}">
-                <a16:creationId xmlns:a16="http://schemas.microsoft.com/office/drawing/2014/main" id="{07C965FA-A87E-4824-AFA8-C67AF548A76A}"/>
+                <a16:creationId xmlns:a16="http://schemas.microsoft.com/office/drawing/2014/main" xmlns="" id="{07C965FA-A87E-4824-AFA8-C67AF548A76A}"/>
               </a:ext>
             </a:extLst>
           </p:cNvPr>
@@ -6739,7 +6739,7 @@
           <p:cNvPr id="3" name="Picture 2">
             <a:extLst>
               <a:ext uri="{FF2B5EF4-FFF2-40B4-BE49-F238E27FC236}">
-                <a16:creationId xmlns:a16="http://schemas.microsoft.com/office/drawing/2014/main" id="{7DC5D9AB-27D1-4866-B85E-1728987FAEF5}"/>
+                <a16:creationId xmlns:a16="http://schemas.microsoft.com/office/drawing/2014/main" xmlns="" id="{7DC5D9AB-27D1-4866-B85E-1728987FAEF5}"/>
               </a:ext>
             </a:extLst>
           </p:cNvPr>
@@ -6775,7 +6775,7 @@
           <p:cNvPr id="10" name="Rectangle 9">
             <a:extLst>
               <a:ext uri="{FF2B5EF4-FFF2-40B4-BE49-F238E27FC236}">
-                <a16:creationId xmlns:a16="http://schemas.microsoft.com/office/drawing/2014/main" id="{86646B95-5E3B-4DE8-9118-031C2C296D8C}"/>
+                <a16:creationId xmlns:a16="http://schemas.microsoft.com/office/drawing/2014/main" xmlns="" id="{86646B95-5E3B-4DE8-9118-031C2C296D8C}"/>
               </a:ext>
             </a:extLst>
           </p:cNvPr>
@@ -6856,7 +6856,7 @@
           <p:cNvPr id="18" name="Title 17">
             <a:extLst>
               <a:ext uri="{FF2B5EF4-FFF2-40B4-BE49-F238E27FC236}">
-                <a16:creationId xmlns:a16="http://schemas.microsoft.com/office/drawing/2014/main" id="{AE87ED9C-76E1-4D85-9B06-3AF44AABB668}"/>
+                <a16:creationId xmlns:a16="http://schemas.microsoft.com/office/drawing/2014/main" xmlns="" id="{AE87ED9C-76E1-4D85-9B06-3AF44AABB668}"/>
               </a:ext>
             </a:extLst>
           </p:cNvPr>
@@ -7626,7 +7626,7 @@
           <p:cNvPr id="5" name="Picture 4">
             <a:extLst>
               <a:ext uri="{FF2B5EF4-FFF2-40B4-BE49-F238E27FC236}">
-                <a16:creationId xmlns:a16="http://schemas.microsoft.com/office/drawing/2014/main" id="{3FC8E1F8-6924-4050-9FA6-EFB9C98F010C}"/>
+                <a16:creationId xmlns:a16="http://schemas.microsoft.com/office/drawing/2014/main" xmlns="" id="{3FC8E1F8-6924-4050-9FA6-EFB9C98F010C}"/>
               </a:ext>
             </a:extLst>
           </p:cNvPr>
@@ -7749,7 +7749,7 @@
             <a:fld id="{055373AC-9AA7-423B-BA00-BA1C74164DBD}" type="datetime1">
               <a:rPr lang="en-US" smtClean="0"/>
               <a:pPr/>
-              <a:t>11/11/2019</a:t>
+              <a:t>11/21/2019</a:t>
             </a:fld>
             <a:endParaRPr lang="en-US" dirty="0"/>
           </a:p>
@@ -7961,7 +7961,7 @@
           <p:cNvPr id="8" name="Picture 7">
             <a:extLst>
               <a:ext uri="{FF2B5EF4-FFF2-40B4-BE49-F238E27FC236}">
-                <a16:creationId xmlns:a16="http://schemas.microsoft.com/office/drawing/2014/main" id="{8A73D250-FD07-4E38-82BE-C93637C3793C}"/>
+                <a16:creationId xmlns:a16="http://schemas.microsoft.com/office/drawing/2014/main" xmlns="" id="{8A73D250-FD07-4E38-82BE-C93637C3793C}"/>
               </a:ext>
             </a:extLst>
           </p:cNvPr>
@@ -8084,7 +8084,7 @@
             <a:fld id="{055373AC-9AA7-423B-BA00-BA1C74164DBD}" type="datetime1">
               <a:rPr lang="en-US" smtClean="0"/>
               <a:pPr/>
-              <a:t>11/11/2019</a:t>
+              <a:t>11/21/2019</a:t>
             </a:fld>
             <a:endParaRPr lang="en-US" dirty="0"/>
           </a:p>
@@ -8403,7 +8403,7 @@
             <a:fld id="{055373AC-9AA7-423B-BA00-BA1C74164DBD}" type="datetime1">
               <a:rPr lang="en-US" smtClean="0"/>
               <a:pPr/>
-              <a:t>11/11/2019</a:t>
+              <a:t>11/21/2019</a:t>
             </a:fld>
             <a:endParaRPr lang="en-US" dirty="0"/>
           </a:p>
@@ -8615,7 +8615,7 @@
           <p:cNvPr id="8" name="Picture 7">
             <a:extLst>
               <a:ext uri="{FF2B5EF4-FFF2-40B4-BE49-F238E27FC236}">
-                <a16:creationId xmlns:a16="http://schemas.microsoft.com/office/drawing/2014/main" id="{83941663-FB3D-4308-B06A-BF7A06722FA4}"/>
+                <a16:creationId xmlns:a16="http://schemas.microsoft.com/office/drawing/2014/main" xmlns="" id="{83941663-FB3D-4308-B06A-BF7A06722FA4}"/>
               </a:ext>
             </a:extLst>
           </p:cNvPr>
@@ -8681,7 +8681,7 @@
           <p:cNvPr id="11" name="Picture 10">
             <a:extLst>
               <a:ext uri="{FF2B5EF4-FFF2-40B4-BE49-F238E27FC236}">
-                <a16:creationId xmlns:a16="http://schemas.microsoft.com/office/drawing/2014/main" id="{C1E40596-5F7F-41C3-9807-7FA635B42492}"/>
+                <a16:creationId xmlns:a16="http://schemas.microsoft.com/office/drawing/2014/main" xmlns="" id="{C1E40596-5F7F-41C3-9807-7FA635B42492}"/>
               </a:ext>
             </a:extLst>
           </p:cNvPr>
@@ -8710,7 +8710,7 @@
           <p:cNvPr id="7" name="Rectangle 6">
             <a:extLst>
               <a:ext uri="{FF2B5EF4-FFF2-40B4-BE49-F238E27FC236}">
-                <a16:creationId xmlns:a16="http://schemas.microsoft.com/office/drawing/2014/main" id="{C5951C9B-3DEE-4E28-8D4C-55505E0CB6AB}"/>
+                <a16:creationId xmlns:a16="http://schemas.microsoft.com/office/drawing/2014/main" xmlns="" id="{C5951C9B-3DEE-4E28-8D4C-55505E0CB6AB}"/>
               </a:ext>
             </a:extLst>
           </p:cNvPr>
@@ -8791,7 +8791,7 @@
           <p:cNvPr id="9" name="Picture 8" descr="A drawing of a cartoon character&#10;&#10;Description generated with high confidence">
             <a:extLst>
               <a:ext uri="{FF2B5EF4-FFF2-40B4-BE49-F238E27FC236}">
-                <a16:creationId xmlns:a16="http://schemas.microsoft.com/office/drawing/2014/main" id="{DC4365F6-D2C1-47B4-8477-38FD2C7711AA}"/>
+                <a16:creationId xmlns:a16="http://schemas.microsoft.com/office/drawing/2014/main" xmlns="" id="{DC4365F6-D2C1-47B4-8477-38FD2C7711AA}"/>
               </a:ext>
             </a:extLst>
           </p:cNvPr>
@@ -8827,7 +8827,7 @@
           <p:cNvPr id="12" name="Title 11">
             <a:extLst>
               <a:ext uri="{FF2B5EF4-FFF2-40B4-BE49-F238E27FC236}">
-                <a16:creationId xmlns:a16="http://schemas.microsoft.com/office/drawing/2014/main" id="{48CCE616-2FC8-4941-8612-3EC8CFD842E0}"/>
+                <a16:creationId xmlns:a16="http://schemas.microsoft.com/office/drawing/2014/main" xmlns="" id="{48CCE616-2FC8-4941-8612-3EC8CFD842E0}"/>
               </a:ext>
             </a:extLst>
           </p:cNvPr>
@@ -8863,7 +8863,7 @@
           <p:cNvPr id="23" name="Text Placeholder 22">
             <a:extLst>
               <a:ext uri="{FF2B5EF4-FFF2-40B4-BE49-F238E27FC236}">
-                <a16:creationId xmlns:a16="http://schemas.microsoft.com/office/drawing/2014/main" id="{889D93F4-ABFA-46BF-8E5D-FE6562ACB20F}"/>
+                <a16:creationId xmlns:a16="http://schemas.microsoft.com/office/drawing/2014/main" xmlns="" id="{889D93F4-ABFA-46BF-8E5D-FE6562ACB20F}"/>
               </a:ext>
             </a:extLst>
           </p:cNvPr>
@@ -8922,7 +8922,7 @@
           <p:cNvPr id="10" name="Picture 9">
             <a:extLst>
               <a:ext uri="{FF2B5EF4-FFF2-40B4-BE49-F238E27FC236}">
-                <a16:creationId xmlns:a16="http://schemas.microsoft.com/office/drawing/2014/main" id="{DF7D6D63-C0D2-4213-B1FA-96890BDE6C03}"/>
+                <a16:creationId xmlns:a16="http://schemas.microsoft.com/office/drawing/2014/main" xmlns="" id="{DF7D6D63-C0D2-4213-B1FA-96890BDE6C03}"/>
               </a:ext>
             </a:extLst>
           </p:cNvPr>
@@ -8958,7 +8958,7 @@
           <p:cNvPr id="14" name="Date Placeholder 13">
             <a:extLst>
               <a:ext uri="{FF2B5EF4-FFF2-40B4-BE49-F238E27FC236}">
-                <a16:creationId xmlns:a16="http://schemas.microsoft.com/office/drawing/2014/main" id="{0AA6AF62-9F6D-4B1C-831C-72AACA29F786}"/>
+                <a16:creationId xmlns:a16="http://schemas.microsoft.com/office/drawing/2014/main" xmlns="" id="{0AA6AF62-9F6D-4B1C-831C-72AACA29F786}"/>
               </a:ext>
             </a:extLst>
           </p:cNvPr>
@@ -8977,7 +8977,7 @@
             <a:fld id="{055373AC-9AA7-423B-BA00-BA1C74164DBD}" type="datetime1">
               <a:rPr lang="en-US" smtClean="0"/>
               <a:pPr/>
-              <a:t>11/11/2019</a:t>
+              <a:t>11/21/2019</a:t>
             </a:fld>
             <a:endParaRPr lang="en-US" dirty="0"/>
           </a:p>
@@ -8988,7 +8988,7 @@
           <p:cNvPr id="15" name="Footer Placeholder 14">
             <a:extLst>
               <a:ext uri="{FF2B5EF4-FFF2-40B4-BE49-F238E27FC236}">
-                <a16:creationId xmlns:a16="http://schemas.microsoft.com/office/drawing/2014/main" id="{D92A8ED8-1E91-4F87-9AAB-0B939CA64F66}"/>
+                <a16:creationId xmlns:a16="http://schemas.microsoft.com/office/drawing/2014/main" xmlns="" id="{D92A8ED8-1E91-4F87-9AAB-0B939CA64F66}"/>
               </a:ext>
             </a:extLst>
           </p:cNvPr>
@@ -9013,7 +9013,7 @@
           <p:cNvPr id="16" name="Slide Number Placeholder 15">
             <a:extLst>
               <a:ext uri="{FF2B5EF4-FFF2-40B4-BE49-F238E27FC236}">
-                <a16:creationId xmlns:a16="http://schemas.microsoft.com/office/drawing/2014/main" id="{37E4C518-B0B3-4716-AB97-AC8ECA4F7C84}"/>
+                <a16:creationId xmlns:a16="http://schemas.microsoft.com/office/drawing/2014/main" xmlns="" id="{37E4C518-B0B3-4716-AB97-AC8ECA4F7C84}"/>
               </a:ext>
             </a:extLst>
           </p:cNvPr>
@@ -9127,7 +9127,7 @@
             <a:fld id="{055373AC-9AA7-423B-BA00-BA1C74164DBD}" type="datetime1">
               <a:rPr lang="en-US" smtClean="0"/>
               <a:pPr/>
-              <a:t>11/11/2019</a:t>
+              <a:t>11/21/2019</a:t>
             </a:fld>
             <a:endParaRPr lang="en-US" dirty="0"/>
           </a:p>
@@ -9339,7 +9339,7 @@
           <p:cNvPr id="8" name="Picture 7">
             <a:extLst>
               <a:ext uri="{FF2B5EF4-FFF2-40B4-BE49-F238E27FC236}">
-                <a16:creationId xmlns:a16="http://schemas.microsoft.com/office/drawing/2014/main" id="{64BFEAC7-2768-4ADF-B43E-AC8B32C99F78}"/>
+                <a16:creationId xmlns:a16="http://schemas.microsoft.com/office/drawing/2014/main" xmlns="" id="{64BFEAC7-2768-4ADF-B43E-AC8B32C99F78}"/>
               </a:ext>
             </a:extLst>
           </p:cNvPr>
@@ -9450,7 +9450,7 @@
             <a:fld id="{055373AC-9AA7-423B-BA00-BA1C74164DBD}" type="datetime1">
               <a:rPr lang="en-US" smtClean="0"/>
               <a:pPr/>
-              <a:t>11/11/2019</a:t>
+              <a:t>11/21/2019</a:t>
             </a:fld>
             <a:endParaRPr lang="en-US" dirty="0"/>
           </a:p>
@@ -9662,7 +9662,7 @@
           <p:cNvPr id="8" name="Picture 7">
             <a:extLst>
               <a:ext uri="{FF2B5EF4-FFF2-40B4-BE49-F238E27FC236}">
-                <a16:creationId xmlns:a16="http://schemas.microsoft.com/office/drawing/2014/main" id="{AB7D08D3-A561-44E3-A79F-6993D8EE65EB}"/>
+                <a16:creationId xmlns:a16="http://schemas.microsoft.com/office/drawing/2014/main" xmlns="" id="{AB7D08D3-A561-44E3-A79F-6993D8EE65EB}"/>
               </a:ext>
             </a:extLst>
           </p:cNvPr>
@@ -9785,7 +9785,7 @@
             <a:fld id="{055373AC-9AA7-423B-BA00-BA1C74164DBD}" type="datetime1">
               <a:rPr lang="en-US" smtClean="0"/>
               <a:pPr/>
-              <a:t>11/11/2019</a:t>
+              <a:t>11/21/2019</a:t>
             </a:fld>
             <a:endParaRPr lang="en-US" dirty="0"/>
           </a:p>
@@ -9997,7 +9997,7 @@
           <p:cNvPr id="8" name="Picture 7">
             <a:extLst>
               <a:ext uri="{FF2B5EF4-FFF2-40B4-BE49-F238E27FC236}">
-                <a16:creationId xmlns:a16="http://schemas.microsoft.com/office/drawing/2014/main" id="{9669BB51-09D7-4E46-907E-A55FA5FCB683}"/>
+                <a16:creationId xmlns:a16="http://schemas.microsoft.com/office/drawing/2014/main" xmlns="" id="{9669BB51-09D7-4E46-907E-A55FA5FCB683}"/>
               </a:ext>
             </a:extLst>
           </p:cNvPr>
@@ -10075,7 +10075,7 @@
           <p:cNvPr id="10" name="Picture 9">
             <a:extLst>
               <a:ext uri="{FF2B5EF4-FFF2-40B4-BE49-F238E27FC236}">
-                <a16:creationId xmlns:a16="http://schemas.microsoft.com/office/drawing/2014/main" id="{89AD94B5-9922-4E42-89CE-3C445EFB152E}"/>
+                <a16:creationId xmlns:a16="http://schemas.microsoft.com/office/drawing/2014/main" xmlns="" id="{89AD94B5-9922-4E42-89CE-3C445EFB152E}"/>
               </a:ext>
             </a:extLst>
           </p:cNvPr>
@@ -10104,7 +10104,7 @@
           <p:cNvPr id="13" name="Rectangle 12">
             <a:extLst>
               <a:ext uri="{FF2B5EF4-FFF2-40B4-BE49-F238E27FC236}">
-                <a16:creationId xmlns:a16="http://schemas.microsoft.com/office/drawing/2014/main" id="{391AFA4E-7870-4561-A1B8-AC956B0C8931}"/>
+                <a16:creationId xmlns:a16="http://schemas.microsoft.com/office/drawing/2014/main" xmlns="" id="{391AFA4E-7870-4561-A1B8-AC956B0C8931}"/>
               </a:ext>
             </a:extLst>
           </p:cNvPr>
@@ -10185,7 +10185,7 @@
           <p:cNvPr id="3" name="Text Placeholder 2">
             <a:extLst>
               <a:ext uri="{FF2B5EF4-FFF2-40B4-BE49-F238E27FC236}">
-                <a16:creationId xmlns:a16="http://schemas.microsoft.com/office/drawing/2014/main" id="{5A9D2960-6D42-439F-82E8-812822013A10}"/>
+                <a16:creationId xmlns:a16="http://schemas.microsoft.com/office/drawing/2014/main" xmlns="" id="{5A9D2960-6D42-439F-82E8-812822013A10}"/>
               </a:ext>
             </a:extLst>
           </p:cNvPr>
@@ -10248,7 +10248,7 @@
           <p:cNvPr id="6" name="Title 5">
             <a:extLst>
               <a:ext uri="{FF2B5EF4-FFF2-40B4-BE49-F238E27FC236}">
-                <a16:creationId xmlns:a16="http://schemas.microsoft.com/office/drawing/2014/main" id="{19B5B676-7892-440F-8191-7109B2C59885}"/>
+                <a16:creationId xmlns:a16="http://schemas.microsoft.com/office/drawing/2014/main" xmlns="" id="{19B5B676-7892-440F-8191-7109B2C59885}"/>
               </a:ext>
             </a:extLst>
           </p:cNvPr>
@@ -10284,7 +10284,7 @@
           <p:cNvPr id="2" name="Date Placeholder 1">
             <a:extLst>
               <a:ext uri="{FF2B5EF4-FFF2-40B4-BE49-F238E27FC236}">
-                <a16:creationId xmlns:a16="http://schemas.microsoft.com/office/drawing/2014/main" id="{303E2769-FF5C-435B-BEDD-ABA3B8F1B976}"/>
+                <a16:creationId xmlns:a16="http://schemas.microsoft.com/office/drawing/2014/main" xmlns="" id="{303E2769-FF5C-435B-BEDD-ABA3B8F1B976}"/>
               </a:ext>
             </a:extLst>
           </p:cNvPr>
@@ -10303,7 +10303,7 @@
             <a:fld id="{055373AC-9AA7-423B-BA00-BA1C74164DBD}" type="datetime1">
               <a:rPr lang="en-US" smtClean="0"/>
               <a:pPr/>
-              <a:t>11/11/2019</a:t>
+              <a:t>11/21/2019</a:t>
             </a:fld>
             <a:endParaRPr lang="en-US" dirty="0"/>
           </a:p>
@@ -10314,7 +10314,7 @@
           <p:cNvPr id="4" name="Footer Placeholder 3">
             <a:extLst>
               <a:ext uri="{FF2B5EF4-FFF2-40B4-BE49-F238E27FC236}">
-                <a16:creationId xmlns:a16="http://schemas.microsoft.com/office/drawing/2014/main" id="{9CB6AD27-58D7-46FA-99F8-E5BB835ADA68}"/>
+                <a16:creationId xmlns:a16="http://schemas.microsoft.com/office/drawing/2014/main" xmlns="" id="{9CB6AD27-58D7-46FA-99F8-E5BB835ADA68}"/>
               </a:ext>
             </a:extLst>
           </p:cNvPr>
@@ -10339,7 +10339,7 @@
           <p:cNvPr id="5" name="Slide Number Placeholder 4">
             <a:extLst>
               <a:ext uri="{FF2B5EF4-FFF2-40B4-BE49-F238E27FC236}">
-                <a16:creationId xmlns:a16="http://schemas.microsoft.com/office/drawing/2014/main" id="{389DA7C9-2FCE-40EB-BF32-C6983222020F}"/>
+                <a16:creationId xmlns:a16="http://schemas.microsoft.com/office/drawing/2014/main" xmlns="" id="{389DA7C9-2FCE-40EB-BF32-C6983222020F}"/>
               </a:ext>
             </a:extLst>
           </p:cNvPr>
@@ -10369,7 +10369,7 @@
           <p:cNvPr id="11" name="Picture 10">
             <a:extLst>
               <a:ext uri="{FF2B5EF4-FFF2-40B4-BE49-F238E27FC236}">
-                <a16:creationId xmlns:a16="http://schemas.microsoft.com/office/drawing/2014/main" id="{0991B60F-461F-45D1-A35C-8AC3D83E7AD8}"/>
+                <a16:creationId xmlns:a16="http://schemas.microsoft.com/office/drawing/2014/main" xmlns="" id="{0991B60F-461F-45D1-A35C-8AC3D83E7AD8}"/>
               </a:ext>
             </a:extLst>
           </p:cNvPr>
@@ -10444,7 +10444,7 @@
           <p:cNvPr id="6" name="Picture 5">
             <a:extLst>
               <a:ext uri="{FF2B5EF4-FFF2-40B4-BE49-F238E27FC236}">
-                <a16:creationId xmlns:a16="http://schemas.microsoft.com/office/drawing/2014/main" id="{455D431A-1BDA-40DB-B7D8-23653331B7C3}"/>
+                <a16:creationId xmlns:a16="http://schemas.microsoft.com/office/drawing/2014/main" xmlns="" id="{455D431A-1BDA-40DB-B7D8-23653331B7C3}"/>
               </a:ext>
             </a:extLst>
           </p:cNvPr>
@@ -10678,7 +10678,7 @@
           <p:cNvPr id="16" name="Picture 15">
             <a:extLst>
               <a:ext uri="{FF2B5EF4-FFF2-40B4-BE49-F238E27FC236}">
-                <a16:creationId xmlns:a16="http://schemas.microsoft.com/office/drawing/2014/main" id="{B0FF4B1E-24EA-407C-BFA6-24CCB6D4409A}"/>
+                <a16:creationId xmlns:a16="http://schemas.microsoft.com/office/drawing/2014/main" xmlns="" id="{B0FF4B1E-24EA-407C-BFA6-24CCB6D4409A}"/>
               </a:ext>
             </a:extLst>
           </p:cNvPr>
@@ -10862,7 +10862,7 @@
           <p:cNvPr id="7" name="Text Placeholder 6">
             <a:extLst>
               <a:ext uri="{FF2B5EF4-FFF2-40B4-BE49-F238E27FC236}">
-                <a16:creationId xmlns:a16="http://schemas.microsoft.com/office/drawing/2014/main" id="{CB4CB13C-66A1-466B-A6C1-B0BABF5CFEC1}"/>
+                <a16:creationId xmlns:a16="http://schemas.microsoft.com/office/drawing/2014/main" xmlns="" id="{CB4CB13C-66A1-466B-A6C1-B0BABF5CFEC1}"/>
               </a:ext>
             </a:extLst>
           </p:cNvPr>
@@ -10961,7 +10961,7 @@
           <p:cNvPr id="12" name="Title 11">
             <a:extLst>
               <a:ext uri="{FF2B5EF4-FFF2-40B4-BE49-F238E27FC236}">
-                <a16:creationId xmlns:a16="http://schemas.microsoft.com/office/drawing/2014/main" id="{4ED30444-7448-455E-ACFD-2D8F93C93971}"/>
+                <a16:creationId xmlns:a16="http://schemas.microsoft.com/office/drawing/2014/main" xmlns="" id="{4ED30444-7448-455E-ACFD-2D8F93C93971}"/>
               </a:ext>
             </a:extLst>
           </p:cNvPr>
@@ -10998,7 +10998,7 @@
           <p:cNvPr id="15" name="Picture 14">
             <a:extLst>
               <a:ext uri="{FF2B5EF4-FFF2-40B4-BE49-F238E27FC236}">
-                <a16:creationId xmlns:a16="http://schemas.microsoft.com/office/drawing/2014/main" id="{00505D47-5EAF-4709-A366-B1437B044AC8}"/>
+                <a16:creationId xmlns:a16="http://schemas.microsoft.com/office/drawing/2014/main" xmlns="" id="{00505D47-5EAF-4709-A366-B1437B044AC8}"/>
               </a:ext>
             </a:extLst>
           </p:cNvPr>
@@ -11034,7 +11034,7 @@
           <p:cNvPr id="8" name="Date Placeholder 7">
             <a:extLst>
               <a:ext uri="{FF2B5EF4-FFF2-40B4-BE49-F238E27FC236}">
-                <a16:creationId xmlns:a16="http://schemas.microsoft.com/office/drawing/2014/main" id="{CF9A2DC4-5280-4E93-B6D2-9709FE6D0627}"/>
+                <a16:creationId xmlns:a16="http://schemas.microsoft.com/office/drawing/2014/main" xmlns="" id="{CF9A2DC4-5280-4E93-B6D2-9709FE6D0627}"/>
               </a:ext>
             </a:extLst>
           </p:cNvPr>
@@ -11053,7 +11053,7 @@
             <a:fld id="{055373AC-9AA7-423B-BA00-BA1C74164DBD}" type="datetime1">
               <a:rPr lang="en-US" smtClean="0"/>
               <a:pPr/>
-              <a:t>11/11/2019</a:t>
+              <a:t>11/21/2019</a:t>
             </a:fld>
             <a:endParaRPr lang="en-US" dirty="0"/>
           </a:p>
@@ -11064,7 +11064,7 @@
           <p:cNvPr id="10" name="Footer Placeholder 9">
             <a:extLst>
               <a:ext uri="{FF2B5EF4-FFF2-40B4-BE49-F238E27FC236}">
-                <a16:creationId xmlns:a16="http://schemas.microsoft.com/office/drawing/2014/main" id="{FA4C1EE0-8040-49CB-9319-CF991DE7B325}"/>
+                <a16:creationId xmlns:a16="http://schemas.microsoft.com/office/drawing/2014/main" xmlns="" id="{FA4C1EE0-8040-49CB-9319-CF991DE7B325}"/>
               </a:ext>
             </a:extLst>
           </p:cNvPr>
@@ -11089,7 +11089,7 @@
           <p:cNvPr id="17" name="Slide Number Placeholder 16">
             <a:extLst>
               <a:ext uri="{FF2B5EF4-FFF2-40B4-BE49-F238E27FC236}">
-                <a16:creationId xmlns:a16="http://schemas.microsoft.com/office/drawing/2014/main" id="{1643825A-6B67-4224-B077-B526FC2A4C74}"/>
+                <a16:creationId xmlns:a16="http://schemas.microsoft.com/office/drawing/2014/main" xmlns="" id="{1643825A-6B67-4224-B077-B526FC2A4C74}"/>
               </a:ext>
             </a:extLst>
           </p:cNvPr>
@@ -11158,7 +11158,7 @@
           <p:cNvPr id="17" name="Picture 16">
             <a:extLst>
               <a:ext uri="{FF2B5EF4-FFF2-40B4-BE49-F238E27FC236}">
-                <a16:creationId xmlns:a16="http://schemas.microsoft.com/office/drawing/2014/main" id="{3DA6B0AA-1988-451B-88D4-0F726295570B}"/>
+                <a16:creationId xmlns:a16="http://schemas.microsoft.com/office/drawing/2014/main" xmlns="" id="{3DA6B0AA-1988-451B-88D4-0F726295570B}"/>
               </a:ext>
             </a:extLst>
           </p:cNvPr>
@@ -11187,7 +11187,7 @@
           <p:cNvPr id="12" name="Rectangle 11">
             <a:extLst>
               <a:ext uri="{FF2B5EF4-FFF2-40B4-BE49-F238E27FC236}">
-                <a16:creationId xmlns:a16="http://schemas.microsoft.com/office/drawing/2014/main" id="{345FB1C8-7F66-4D5C-ACCE-AE919936BCFD}"/>
+                <a16:creationId xmlns:a16="http://schemas.microsoft.com/office/drawing/2014/main" xmlns="" id="{345FB1C8-7F66-4D5C-ACCE-AE919936BCFD}"/>
               </a:ext>
             </a:extLst>
           </p:cNvPr>
@@ -11309,7 +11309,7 @@
           <p:cNvPr id="13" name="Title 11">
             <a:extLst>
               <a:ext uri="{FF2B5EF4-FFF2-40B4-BE49-F238E27FC236}">
-                <a16:creationId xmlns:a16="http://schemas.microsoft.com/office/drawing/2014/main" id="{0D5CC956-5C4A-44BE-8F8B-327FAFA51E97}"/>
+                <a16:creationId xmlns:a16="http://schemas.microsoft.com/office/drawing/2014/main" xmlns="" id="{0D5CC956-5C4A-44BE-8F8B-327FAFA51E97}"/>
               </a:ext>
             </a:extLst>
           </p:cNvPr>
@@ -11346,7 +11346,7 @@
           <p:cNvPr id="15" name="Text Placeholder 6">
             <a:extLst>
               <a:ext uri="{FF2B5EF4-FFF2-40B4-BE49-F238E27FC236}">
-                <a16:creationId xmlns:a16="http://schemas.microsoft.com/office/drawing/2014/main" id="{6157C8DE-E0AF-422B-BBB1-F0AF1264B5E9}"/>
+                <a16:creationId xmlns:a16="http://schemas.microsoft.com/office/drawing/2014/main" xmlns="" id="{6157C8DE-E0AF-422B-BBB1-F0AF1264B5E9}"/>
               </a:ext>
             </a:extLst>
           </p:cNvPr>
@@ -11445,7 +11445,7 @@
           <p:cNvPr id="2" name="Date Placeholder 1">
             <a:extLst>
               <a:ext uri="{FF2B5EF4-FFF2-40B4-BE49-F238E27FC236}">
-                <a16:creationId xmlns:a16="http://schemas.microsoft.com/office/drawing/2014/main" id="{3FF2A4EF-FDC7-4D65-91A0-D3473057251B}"/>
+                <a16:creationId xmlns:a16="http://schemas.microsoft.com/office/drawing/2014/main" xmlns="" id="{3FF2A4EF-FDC7-4D65-91A0-D3473057251B}"/>
               </a:ext>
             </a:extLst>
           </p:cNvPr>
@@ -11464,7 +11464,7 @@
             <a:fld id="{055373AC-9AA7-423B-BA00-BA1C74164DBD}" type="datetime1">
               <a:rPr lang="en-US" smtClean="0"/>
               <a:pPr/>
-              <a:t>11/11/2019</a:t>
+              <a:t>11/21/2019</a:t>
             </a:fld>
             <a:endParaRPr lang="en-US" dirty="0"/>
           </a:p>
@@ -11475,7 +11475,7 @@
           <p:cNvPr id="3" name="Footer Placeholder 2">
             <a:extLst>
               <a:ext uri="{FF2B5EF4-FFF2-40B4-BE49-F238E27FC236}">
-                <a16:creationId xmlns:a16="http://schemas.microsoft.com/office/drawing/2014/main" id="{2AD0B15D-022F-4B93-A0E6-6FC062C18AF1}"/>
+                <a16:creationId xmlns:a16="http://schemas.microsoft.com/office/drawing/2014/main" xmlns="" id="{2AD0B15D-022F-4B93-A0E6-6FC062C18AF1}"/>
               </a:ext>
             </a:extLst>
           </p:cNvPr>
@@ -11500,7 +11500,7 @@
           <p:cNvPr id="4" name="Slide Number Placeholder 3">
             <a:extLst>
               <a:ext uri="{FF2B5EF4-FFF2-40B4-BE49-F238E27FC236}">
-                <a16:creationId xmlns:a16="http://schemas.microsoft.com/office/drawing/2014/main" id="{72845B5C-C9D2-4885-BBE1-AE0D4F570CBF}"/>
+                <a16:creationId xmlns:a16="http://schemas.microsoft.com/office/drawing/2014/main" xmlns="" id="{72845B5C-C9D2-4885-BBE1-AE0D4F570CBF}"/>
               </a:ext>
             </a:extLst>
           </p:cNvPr>
@@ -11530,7 +11530,7 @@
           <p:cNvPr id="11" name="Picture 10">
             <a:extLst>
               <a:ext uri="{FF2B5EF4-FFF2-40B4-BE49-F238E27FC236}">
-                <a16:creationId xmlns:a16="http://schemas.microsoft.com/office/drawing/2014/main" id="{A1E6AED5-8603-4881-90EA-963A2A5A2C03}"/>
+                <a16:creationId xmlns:a16="http://schemas.microsoft.com/office/drawing/2014/main" xmlns="" id="{A1E6AED5-8603-4881-90EA-963A2A5A2C03}"/>
               </a:ext>
             </a:extLst>
           </p:cNvPr>
@@ -11605,7 +11605,7 @@
           <p:cNvPr id="10" name="Picture 9">
             <a:extLst>
               <a:ext uri="{FF2B5EF4-FFF2-40B4-BE49-F238E27FC236}">
-                <a16:creationId xmlns:a16="http://schemas.microsoft.com/office/drawing/2014/main" id="{89AD94B5-9922-4E42-89CE-3C445EFB152E}"/>
+                <a16:creationId xmlns:a16="http://schemas.microsoft.com/office/drawing/2014/main" xmlns="" id="{89AD94B5-9922-4E42-89CE-3C445EFB152E}"/>
               </a:ext>
             </a:extLst>
           </p:cNvPr>
@@ -11634,7 +11634,7 @@
           <p:cNvPr id="13" name="Rectangle 12">
             <a:extLst>
               <a:ext uri="{FF2B5EF4-FFF2-40B4-BE49-F238E27FC236}">
-                <a16:creationId xmlns:a16="http://schemas.microsoft.com/office/drawing/2014/main" id="{391AFA4E-7870-4561-A1B8-AC956B0C8931}"/>
+                <a16:creationId xmlns:a16="http://schemas.microsoft.com/office/drawing/2014/main" xmlns="" id="{391AFA4E-7870-4561-A1B8-AC956B0C8931}"/>
               </a:ext>
             </a:extLst>
           </p:cNvPr>
@@ -11715,7 +11715,7 @@
           <p:cNvPr id="3" name="Text Placeholder 2">
             <a:extLst>
               <a:ext uri="{FF2B5EF4-FFF2-40B4-BE49-F238E27FC236}">
-                <a16:creationId xmlns:a16="http://schemas.microsoft.com/office/drawing/2014/main" id="{5A9D2960-6D42-439F-82E8-812822013A10}"/>
+                <a16:creationId xmlns:a16="http://schemas.microsoft.com/office/drawing/2014/main" xmlns="" id="{5A9D2960-6D42-439F-82E8-812822013A10}"/>
               </a:ext>
             </a:extLst>
           </p:cNvPr>
@@ -11778,7 +11778,7 @@
           <p:cNvPr id="6" name="Title 5">
             <a:extLst>
               <a:ext uri="{FF2B5EF4-FFF2-40B4-BE49-F238E27FC236}">
-                <a16:creationId xmlns:a16="http://schemas.microsoft.com/office/drawing/2014/main" id="{19B5B676-7892-440F-8191-7109B2C59885}"/>
+                <a16:creationId xmlns:a16="http://schemas.microsoft.com/office/drawing/2014/main" xmlns="" id="{19B5B676-7892-440F-8191-7109B2C59885}"/>
               </a:ext>
             </a:extLst>
           </p:cNvPr>
@@ -11814,7 +11814,7 @@
           <p:cNvPr id="2" name="Date Placeholder 1">
             <a:extLst>
               <a:ext uri="{FF2B5EF4-FFF2-40B4-BE49-F238E27FC236}">
-                <a16:creationId xmlns:a16="http://schemas.microsoft.com/office/drawing/2014/main" id="{303E2769-FF5C-435B-BEDD-ABA3B8F1B976}"/>
+                <a16:creationId xmlns:a16="http://schemas.microsoft.com/office/drawing/2014/main" xmlns="" id="{303E2769-FF5C-435B-BEDD-ABA3B8F1B976}"/>
               </a:ext>
             </a:extLst>
           </p:cNvPr>
@@ -11833,7 +11833,7 @@
             <a:fld id="{055373AC-9AA7-423B-BA00-BA1C74164DBD}" type="datetime1">
               <a:rPr lang="en-US" smtClean="0"/>
               <a:pPr/>
-              <a:t>11/11/2019</a:t>
+              <a:t>11/21/2019</a:t>
             </a:fld>
             <a:endParaRPr lang="en-US" dirty="0"/>
           </a:p>
@@ -11844,7 +11844,7 @@
           <p:cNvPr id="4" name="Footer Placeholder 3">
             <a:extLst>
               <a:ext uri="{FF2B5EF4-FFF2-40B4-BE49-F238E27FC236}">
-                <a16:creationId xmlns:a16="http://schemas.microsoft.com/office/drawing/2014/main" id="{9CB6AD27-58D7-46FA-99F8-E5BB835ADA68}"/>
+                <a16:creationId xmlns:a16="http://schemas.microsoft.com/office/drawing/2014/main" xmlns="" id="{9CB6AD27-58D7-46FA-99F8-E5BB835ADA68}"/>
               </a:ext>
             </a:extLst>
           </p:cNvPr>
@@ -11869,7 +11869,7 @@
           <p:cNvPr id="5" name="Slide Number Placeholder 4">
             <a:extLst>
               <a:ext uri="{FF2B5EF4-FFF2-40B4-BE49-F238E27FC236}">
-                <a16:creationId xmlns:a16="http://schemas.microsoft.com/office/drawing/2014/main" id="{389DA7C9-2FCE-40EB-BF32-C6983222020F}"/>
+                <a16:creationId xmlns:a16="http://schemas.microsoft.com/office/drawing/2014/main" xmlns="" id="{389DA7C9-2FCE-40EB-BF32-C6983222020F}"/>
               </a:ext>
             </a:extLst>
           </p:cNvPr>
@@ -11899,7 +11899,7 @@
           <p:cNvPr id="11" name="Picture 10">
             <a:extLst>
               <a:ext uri="{FF2B5EF4-FFF2-40B4-BE49-F238E27FC236}">
-                <a16:creationId xmlns:a16="http://schemas.microsoft.com/office/drawing/2014/main" id="{0991B60F-461F-45D1-A35C-8AC3D83E7AD8}"/>
+                <a16:creationId xmlns:a16="http://schemas.microsoft.com/office/drawing/2014/main" xmlns="" id="{0991B60F-461F-45D1-A35C-8AC3D83E7AD8}"/>
               </a:ext>
             </a:extLst>
           </p:cNvPr>
@@ -12012,7 +12012,7 @@
           <p:cNvPr id="14" name="Picture 13">
             <a:extLst>
               <a:ext uri="{FF2B5EF4-FFF2-40B4-BE49-F238E27FC236}">
-                <a16:creationId xmlns:a16="http://schemas.microsoft.com/office/drawing/2014/main" id="{79D60504-DA9E-4357-9A0A-15E333FC2783}"/>
+                <a16:creationId xmlns:a16="http://schemas.microsoft.com/office/drawing/2014/main" xmlns="" id="{79D60504-DA9E-4357-9A0A-15E333FC2783}"/>
               </a:ext>
             </a:extLst>
           </p:cNvPr>
@@ -12041,7 +12041,7 @@
           <p:cNvPr id="13" name="Rectangle 12">
             <a:extLst>
               <a:ext uri="{FF2B5EF4-FFF2-40B4-BE49-F238E27FC236}">
-                <a16:creationId xmlns:a16="http://schemas.microsoft.com/office/drawing/2014/main" id="{57B03959-5ED4-4593-8CEF-2AE1A73775F5}"/>
+                <a16:creationId xmlns:a16="http://schemas.microsoft.com/office/drawing/2014/main" xmlns="" id="{57B03959-5ED4-4593-8CEF-2AE1A73775F5}"/>
               </a:ext>
             </a:extLst>
           </p:cNvPr>
@@ -12279,7 +12279,7 @@
           <p:cNvPr id="6" name="Title 5">
             <a:extLst>
               <a:ext uri="{FF2B5EF4-FFF2-40B4-BE49-F238E27FC236}">
-                <a16:creationId xmlns:a16="http://schemas.microsoft.com/office/drawing/2014/main" id="{38A09987-8827-47B7-85D3-6D69487FC731}"/>
+                <a16:creationId xmlns:a16="http://schemas.microsoft.com/office/drawing/2014/main" xmlns="" id="{38A09987-8827-47B7-85D3-6D69487FC731}"/>
               </a:ext>
             </a:extLst>
           </p:cNvPr>
@@ -12315,7 +12315,7 @@
           <p:cNvPr id="12" name="Picture 11">
             <a:extLst>
               <a:ext uri="{FF2B5EF4-FFF2-40B4-BE49-F238E27FC236}">
-                <a16:creationId xmlns:a16="http://schemas.microsoft.com/office/drawing/2014/main" id="{7028D2F0-1E67-414B-A93D-D3F8F131A132}"/>
+                <a16:creationId xmlns:a16="http://schemas.microsoft.com/office/drawing/2014/main" xmlns="" id="{7028D2F0-1E67-414B-A93D-D3F8F131A132}"/>
               </a:ext>
             </a:extLst>
           </p:cNvPr>
@@ -12351,7 +12351,7 @@
           <p:cNvPr id="9" name="Text Placeholder 2">
             <a:extLst>
               <a:ext uri="{FF2B5EF4-FFF2-40B4-BE49-F238E27FC236}">
-                <a16:creationId xmlns:a16="http://schemas.microsoft.com/office/drawing/2014/main" id="{C8A626D2-456B-41EF-9818-EA8DD7E314DA}"/>
+                <a16:creationId xmlns:a16="http://schemas.microsoft.com/office/drawing/2014/main" xmlns="" id="{C8A626D2-456B-41EF-9818-EA8DD7E314DA}"/>
               </a:ext>
             </a:extLst>
           </p:cNvPr>
@@ -12414,7 +12414,7 @@
           <p:cNvPr id="10" name="Text Placeholder 2">
             <a:extLst>
               <a:ext uri="{FF2B5EF4-FFF2-40B4-BE49-F238E27FC236}">
-                <a16:creationId xmlns:a16="http://schemas.microsoft.com/office/drawing/2014/main" id="{AF69A59F-C564-4A04-B1CC-31C261499991}"/>
+                <a16:creationId xmlns:a16="http://schemas.microsoft.com/office/drawing/2014/main" xmlns="" id="{AF69A59F-C564-4A04-B1CC-31C261499991}"/>
               </a:ext>
             </a:extLst>
           </p:cNvPr>
@@ -12477,7 +12477,7 @@
           <p:cNvPr id="5" name="Date Placeholder 4">
             <a:extLst>
               <a:ext uri="{FF2B5EF4-FFF2-40B4-BE49-F238E27FC236}">
-                <a16:creationId xmlns:a16="http://schemas.microsoft.com/office/drawing/2014/main" id="{F858E34E-73A2-41B4-8C58-4DDB1D4D97D8}"/>
+                <a16:creationId xmlns:a16="http://schemas.microsoft.com/office/drawing/2014/main" xmlns="" id="{F858E34E-73A2-41B4-8C58-4DDB1D4D97D8}"/>
               </a:ext>
             </a:extLst>
           </p:cNvPr>
@@ -12501,7 +12501,7 @@
             <a:fld id="{055373AC-9AA7-423B-BA00-BA1C74164DBD}" type="datetime1">
               <a:rPr lang="en-US" smtClean="0"/>
               <a:pPr/>
-              <a:t>11/11/2019</a:t>
+              <a:t>11/21/2019</a:t>
             </a:fld>
             <a:endParaRPr lang="en-US" dirty="0"/>
           </a:p>
@@ -12512,7 +12512,7 @@
           <p:cNvPr id="7" name="Footer Placeholder 6">
             <a:extLst>
               <a:ext uri="{FF2B5EF4-FFF2-40B4-BE49-F238E27FC236}">
-                <a16:creationId xmlns:a16="http://schemas.microsoft.com/office/drawing/2014/main" id="{47141AFF-42FF-4AAA-A3FA-149DDA66FCC2}"/>
+                <a16:creationId xmlns:a16="http://schemas.microsoft.com/office/drawing/2014/main" xmlns="" id="{47141AFF-42FF-4AAA-A3FA-149DDA66FCC2}"/>
               </a:ext>
             </a:extLst>
           </p:cNvPr>
@@ -12537,7 +12537,7 @@
           <p:cNvPr id="8" name="Slide Number Placeholder 7">
             <a:extLst>
               <a:ext uri="{FF2B5EF4-FFF2-40B4-BE49-F238E27FC236}">
-                <a16:creationId xmlns:a16="http://schemas.microsoft.com/office/drawing/2014/main" id="{92B2616D-7BC8-4F96-B3A7-B299A353B427}"/>
+                <a16:creationId xmlns:a16="http://schemas.microsoft.com/office/drawing/2014/main" xmlns="" id="{92B2616D-7BC8-4F96-B3A7-B299A353B427}"/>
               </a:ext>
             </a:extLst>
           </p:cNvPr>
@@ -12575,7 +12575,7 @@
           <p:cNvPr id="15" name="Picture 14">
             <a:extLst>
               <a:ext uri="{FF2B5EF4-FFF2-40B4-BE49-F238E27FC236}">
-                <a16:creationId xmlns:a16="http://schemas.microsoft.com/office/drawing/2014/main" id="{23AACB49-5E4F-4436-9D82-E83B52A7FCB8}"/>
+                <a16:creationId xmlns:a16="http://schemas.microsoft.com/office/drawing/2014/main" xmlns="" id="{23AACB49-5E4F-4436-9D82-E83B52A7FCB8}"/>
               </a:ext>
             </a:extLst>
           </p:cNvPr>
@@ -12627,7 +12627,7 @@
   <p:hf hdr="0" ftr="0" dt="0"/>
   <p:extLst mod="1">
     <p:ext uri="{DCECCB84-F9BA-43D5-87BE-67443E8EF086}">
-      <p15:sldGuideLst xmlns:p15="http://schemas.microsoft.com/office/powerpoint/2012/main">
+      <p15:sldGuideLst xmlns:p15="http://schemas.microsoft.com/office/powerpoint/2012/main" xmlns="">
         <p15:guide id="1" orient="horz" pos="2160">
           <p15:clr>
             <a:srgbClr val="FBAE40"/>
@@ -12666,7 +12666,7 @@
           <p:cNvPr id="15" name="Picture 14">
             <a:extLst>
               <a:ext uri="{FF2B5EF4-FFF2-40B4-BE49-F238E27FC236}">
-                <a16:creationId xmlns:a16="http://schemas.microsoft.com/office/drawing/2014/main" id="{C19C6415-13AB-4677-935E-D11508C4AD27}"/>
+                <a16:creationId xmlns:a16="http://schemas.microsoft.com/office/drawing/2014/main" xmlns="" id="{C19C6415-13AB-4677-935E-D11508C4AD27}"/>
               </a:ext>
             </a:extLst>
           </p:cNvPr>
@@ -12695,7 +12695,7 @@
           <p:cNvPr id="13" name="Rectangle 12">
             <a:extLst>
               <a:ext uri="{FF2B5EF4-FFF2-40B4-BE49-F238E27FC236}">
-                <a16:creationId xmlns:a16="http://schemas.microsoft.com/office/drawing/2014/main" id="{4B4EBD86-A13A-41DF-A04E-EA4A858E8860}"/>
+                <a16:creationId xmlns:a16="http://schemas.microsoft.com/office/drawing/2014/main" xmlns="" id="{4B4EBD86-A13A-41DF-A04E-EA4A858E8860}"/>
               </a:ext>
             </a:extLst>
           </p:cNvPr>
@@ -12776,7 +12776,7 @@
           <p:cNvPr id="21" name="Text Placeholder 20">
             <a:extLst>
               <a:ext uri="{FF2B5EF4-FFF2-40B4-BE49-F238E27FC236}">
-                <a16:creationId xmlns:a16="http://schemas.microsoft.com/office/drawing/2014/main" id="{04F318BE-2BAD-4677-871C-D78A4BF0CBA6}"/>
+                <a16:creationId xmlns:a16="http://schemas.microsoft.com/office/drawing/2014/main" xmlns="" id="{04F318BE-2BAD-4677-871C-D78A4BF0CBA6}"/>
               </a:ext>
             </a:extLst>
           </p:cNvPr>
@@ -12824,7 +12824,7 @@
           <p:cNvPr id="6" name="Text Placeholder 5">
             <a:extLst>
               <a:ext uri="{FF2B5EF4-FFF2-40B4-BE49-F238E27FC236}">
-                <a16:creationId xmlns:a16="http://schemas.microsoft.com/office/drawing/2014/main" id="{3278A82F-5546-4977-9F75-2A933B415945}"/>
+                <a16:creationId xmlns:a16="http://schemas.microsoft.com/office/drawing/2014/main" xmlns="" id="{3278A82F-5546-4977-9F75-2A933B415945}"/>
               </a:ext>
             </a:extLst>
           </p:cNvPr>
@@ -12905,7 +12905,7 @@
           <p:cNvPr id="2" name="Title 1">
             <a:extLst>
               <a:ext uri="{FF2B5EF4-FFF2-40B4-BE49-F238E27FC236}">
-                <a16:creationId xmlns:a16="http://schemas.microsoft.com/office/drawing/2014/main" id="{03BA3E62-7E9B-447C-9045-B989874D05D3}"/>
+                <a16:creationId xmlns:a16="http://schemas.microsoft.com/office/drawing/2014/main" xmlns="" id="{03BA3E62-7E9B-447C-9045-B989874D05D3}"/>
               </a:ext>
             </a:extLst>
           </p:cNvPr>
@@ -12941,7 +12941,7 @@
           <p:cNvPr id="3" name="Date Placeholder 2">
             <a:extLst>
               <a:ext uri="{FF2B5EF4-FFF2-40B4-BE49-F238E27FC236}">
-                <a16:creationId xmlns:a16="http://schemas.microsoft.com/office/drawing/2014/main" id="{1557BD22-7B02-4D39-928A-4BAD0D84EC13}"/>
+                <a16:creationId xmlns:a16="http://schemas.microsoft.com/office/drawing/2014/main" xmlns="" id="{1557BD22-7B02-4D39-928A-4BAD0D84EC13}"/>
               </a:ext>
             </a:extLst>
           </p:cNvPr>
@@ -12960,7 +12960,7 @@
             <a:fld id="{055373AC-9AA7-423B-BA00-BA1C74164DBD}" type="datetime1">
               <a:rPr lang="en-US" smtClean="0"/>
               <a:pPr/>
-              <a:t>11/11/2019</a:t>
+              <a:t>11/21/2019</a:t>
             </a:fld>
             <a:endParaRPr lang="en-US" dirty="0"/>
           </a:p>
@@ -12971,7 +12971,7 @@
           <p:cNvPr id="4" name="Footer Placeholder 3">
             <a:extLst>
               <a:ext uri="{FF2B5EF4-FFF2-40B4-BE49-F238E27FC236}">
-                <a16:creationId xmlns:a16="http://schemas.microsoft.com/office/drawing/2014/main" id="{12DED1B3-84A5-43D8-8770-B2C1E963B681}"/>
+                <a16:creationId xmlns:a16="http://schemas.microsoft.com/office/drawing/2014/main" xmlns="" id="{12DED1B3-84A5-43D8-8770-B2C1E963B681}"/>
               </a:ext>
             </a:extLst>
           </p:cNvPr>
@@ -12996,7 +12996,7 @@
           <p:cNvPr id="5" name="Slide Number Placeholder 4">
             <a:extLst>
               <a:ext uri="{FF2B5EF4-FFF2-40B4-BE49-F238E27FC236}">
-                <a16:creationId xmlns:a16="http://schemas.microsoft.com/office/drawing/2014/main" id="{6213FF9B-335F-4699-94F7-E43CA829037E}"/>
+                <a16:creationId xmlns:a16="http://schemas.microsoft.com/office/drawing/2014/main" xmlns="" id="{6213FF9B-335F-4699-94F7-E43CA829037E}"/>
               </a:ext>
             </a:extLst>
           </p:cNvPr>
@@ -13026,7 +13026,7 @@
           <p:cNvPr id="11" name="Picture 10">
             <a:extLst>
               <a:ext uri="{FF2B5EF4-FFF2-40B4-BE49-F238E27FC236}">
-                <a16:creationId xmlns:a16="http://schemas.microsoft.com/office/drawing/2014/main" id="{2EB003D1-D2F8-474E-9E8E-075BE60E9273}"/>
+                <a16:creationId xmlns:a16="http://schemas.microsoft.com/office/drawing/2014/main" xmlns="" id="{2EB003D1-D2F8-474E-9E8E-075BE60E9273}"/>
               </a:ext>
             </a:extLst>
           </p:cNvPr>
@@ -13109,7 +13109,7 @@
           <p:cNvPr id="7" name="Date Placeholder 3">
             <a:extLst>
               <a:ext uri="{FF2B5EF4-FFF2-40B4-BE49-F238E27FC236}">
-                <a16:creationId xmlns:a16="http://schemas.microsoft.com/office/drawing/2014/main" id="{0403F5F2-BA1B-4A39-A03D-AD9E0469441C}"/>
+                <a16:creationId xmlns:a16="http://schemas.microsoft.com/office/drawing/2014/main" xmlns="" id="{0403F5F2-BA1B-4A39-A03D-AD9E0469441C}"/>
               </a:ext>
             </a:extLst>
           </p:cNvPr>
@@ -13144,7 +13144,7 @@
             <a:fld id="{055373AC-9AA7-423B-BA00-BA1C74164DBD}" type="datetime1">
               <a:rPr lang="en-US" smtClean="0"/>
               <a:pPr/>
-              <a:t>11/11/2019</a:t>
+              <a:t>11/21/2019</a:t>
             </a:fld>
             <a:endParaRPr lang="en-US" dirty="0"/>
           </a:p>
@@ -13155,7 +13155,7 @@
           <p:cNvPr id="8" name="Footer Placeholder 4">
             <a:extLst>
               <a:ext uri="{FF2B5EF4-FFF2-40B4-BE49-F238E27FC236}">
-                <a16:creationId xmlns:a16="http://schemas.microsoft.com/office/drawing/2014/main" id="{32BCD1B1-3A00-45B1-B516-6B8E7FBC47C4}"/>
+                <a16:creationId xmlns:a16="http://schemas.microsoft.com/office/drawing/2014/main" xmlns="" id="{32BCD1B1-3A00-45B1-B516-6B8E7FBC47C4}"/>
               </a:ext>
             </a:extLst>
           </p:cNvPr>
@@ -13196,7 +13196,7 @@
           <p:cNvPr id="9" name="Slide Number Placeholder 5">
             <a:extLst>
               <a:ext uri="{FF2B5EF4-FFF2-40B4-BE49-F238E27FC236}">
-                <a16:creationId xmlns:a16="http://schemas.microsoft.com/office/drawing/2014/main" id="{0902A4B2-CB08-42CE-A814-FBDF345C2F43}"/>
+                <a16:creationId xmlns:a16="http://schemas.microsoft.com/office/drawing/2014/main" xmlns="" id="{0902A4B2-CB08-42CE-A814-FBDF345C2F43}"/>
               </a:ext>
             </a:extLst>
           </p:cNvPr>
@@ -13242,7 +13242,7 @@
           <p:cNvPr id="10" name="Title Placeholder 1">
             <a:extLst>
               <a:ext uri="{FF2B5EF4-FFF2-40B4-BE49-F238E27FC236}">
-                <a16:creationId xmlns:a16="http://schemas.microsoft.com/office/drawing/2014/main" id="{B770C392-3003-4C35-9625-BB041F8257BA}"/>
+                <a16:creationId xmlns:a16="http://schemas.microsoft.com/office/drawing/2014/main" xmlns="" id="{B770C392-3003-4C35-9625-BB041F8257BA}"/>
               </a:ext>
             </a:extLst>
           </p:cNvPr>
@@ -13281,7 +13281,7 @@
           <p:cNvPr id="11" name="Text Placeholder 2">
             <a:extLst>
               <a:ext uri="{FF2B5EF4-FFF2-40B4-BE49-F238E27FC236}">
-                <a16:creationId xmlns:a16="http://schemas.microsoft.com/office/drawing/2014/main" id="{90CBFB32-9F46-4F2F-8A54-9EE8BED27855}"/>
+                <a16:creationId xmlns:a16="http://schemas.microsoft.com/office/drawing/2014/main" xmlns="" id="{90CBFB32-9F46-4F2F-8A54-9EE8BED27855}"/>
               </a:ext>
             </a:extLst>
           </p:cNvPr>
@@ -13668,7 +13668,7 @@
   </p:txStyles>
   <p:extLst mod="1">
     <p:ext uri="{27BBF7A9-308A-43DC-89C8-2F10F3537804}">
-      <p15:sldGuideLst xmlns:p15="http://schemas.microsoft.com/office/powerpoint/2012/main">
+      <p15:sldGuideLst xmlns:p15="http://schemas.microsoft.com/office/powerpoint/2012/main" xmlns="">
         <p15:guide id="1" orient="horz" pos="2160">
           <p15:clr>
             <a:srgbClr val="F26B43"/>
@@ -13923,7 +13923,7 @@
               <p:nvPr/>
             </p:nvPicPr>
             <p:blipFill>
-              <a:blip r:embed="rId5">
+              <a:blip r:embed="rId5" cstate="print">
                 <a:extLst>
                   <a:ext uri="{28A0092B-C50C-407E-A947-70E740481C1C}">
                     <a14:useLocalDpi xmlns:a14="http://schemas.microsoft.com/office/drawing/2010/main" val="0"/>
@@ -14118,7 +14118,7 @@
           <a:lstStyle/>
           <a:p>
             <a:r>
-              <a:rPr lang="en-US"/>
+              <a:rPr lang="en-US" dirty="0"/>
               <a:t>What is </a:t>
             </a:r>
             <a:r>
@@ -14126,10 +14126,9 @@
               <a:t>AutoMapper</a:t>
             </a:r>
             <a:r>
-              <a:rPr lang="en-US"/>
+              <a:rPr lang="en-US" dirty="0"/>
               <a:t>?</a:t>
             </a:r>
-            <a:endParaRPr lang="en-US" dirty="0"/>
           </a:p>
         </p:txBody>
       </p:sp>
@@ -14223,7 +14222,7 @@
           <p:cNvPr id="11" name="Picture 10">
             <a:extLst>
               <a:ext uri="{FF2B5EF4-FFF2-40B4-BE49-F238E27FC236}">
-                <a16:creationId xmlns:a16="http://schemas.microsoft.com/office/drawing/2014/main" id="{DC184EE0-6256-4AA5-8037-CD39D3D2A78C}"/>
+                <a16:creationId xmlns:a16="http://schemas.microsoft.com/office/drawing/2014/main" xmlns="" id="{DC184EE0-6256-4AA5-8037-CD39D3D2A78C}"/>
               </a:ext>
             </a:extLst>
           </p:cNvPr>
@@ -14590,10 +14589,9 @@
           <a:lstStyle/>
           <a:p>
             <a:r>
-              <a:rPr lang="en-US"/>
+              <a:rPr lang="en-US" dirty="0"/>
               <a:t>Initialization and Configuration</a:t>
             </a:r>
-            <a:endParaRPr lang="en-US" dirty="0"/>
           </a:p>
         </p:txBody>
       </p:sp>
@@ -15313,7 +15311,7 @@
           <a:lstStyle/>
           <a:p>
             <a:r>
-              <a:rPr lang="en-US"/>
+              <a:rPr lang="en-US" dirty="0" smtClean="0"/>
               <a:t>Multiple Mappings</a:t>
             </a:r>
             <a:endParaRPr lang="en-US" dirty="0"/>
@@ -15838,10 +15836,9 @@
           <a:lstStyle/>
           <a:p>
             <a:r>
-              <a:rPr lang="en-US"/>
+              <a:rPr lang="en-US" dirty="0"/>
               <a:t>Map properties that don't match naming convention</a:t>
             </a:r>
-            <a:endParaRPr lang="en-US" dirty="0"/>
           </a:p>
         </p:txBody>
       </p:sp>
@@ -15861,10 +15858,9 @@
           <a:lstStyle/>
           <a:p>
             <a:r>
-              <a:rPr lang="en-US"/>
+              <a:rPr lang="en-US" dirty="0"/>
               <a:t>Custom Member Mapping</a:t>
             </a:r>
-            <a:endParaRPr lang="en-US" dirty="0"/>
           </a:p>
         </p:txBody>
       </p:sp>
@@ -16974,7 +16970,7 @@
           <p:cNvPr id="3" name="Content Placeholder 2">
             <a:extLst>
               <a:ext uri="{FF2B5EF4-FFF2-40B4-BE49-F238E27FC236}">
-                <a16:creationId xmlns:a16="http://schemas.microsoft.com/office/drawing/2014/main" id="{7A402BD3-638B-4B49-9C00-3FB64EF74A80}"/>
+                <a16:creationId xmlns:a16="http://schemas.microsoft.com/office/drawing/2014/main" xmlns="" id="{7A402BD3-638B-4B49-9C00-3FB64EF74A80}"/>
               </a:ext>
             </a:extLst>
           </p:cNvPr>
@@ -17034,7 +17030,7 @@
           <p:cNvPr id="4" name="Title 3">
             <a:extLst>
               <a:ext uri="{FF2B5EF4-FFF2-40B4-BE49-F238E27FC236}">
-                <a16:creationId xmlns:a16="http://schemas.microsoft.com/office/drawing/2014/main" id="{6A1DC7A4-9B6E-4B4F-8D5B-19699B9B6709}"/>
+                <a16:creationId xmlns:a16="http://schemas.microsoft.com/office/drawing/2014/main" xmlns="" id="{6A1DC7A4-9B6E-4B4F-8D5B-19699B9B6709}"/>
               </a:ext>
             </a:extLst>
           </p:cNvPr>
@@ -17051,10 +17047,9 @@
           <a:lstStyle/>
           <a:p>
             <a:r>
-              <a:rPr lang="en-US"/>
+              <a:rPr lang="en-US" dirty="0"/>
               <a:t>Flattening Complex Properties</a:t>
             </a:r>
-            <a:endParaRPr lang="en-US" dirty="0"/>
           </a:p>
         </p:txBody>
       </p:sp>
@@ -17063,7 +17058,7 @@
           <p:cNvPr id="2" name="Slide Number Placeholder 1">
             <a:extLst>
               <a:ext uri="{FF2B5EF4-FFF2-40B4-BE49-F238E27FC236}">
-                <a16:creationId xmlns:a16="http://schemas.microsoft.com/office/drawing/2014/main" id="{B1020120-109F-4008-9782-225D7E01EA32}"/>
+                <a16:creationId xmlns:a16="http://schemas.microsoft.com/office/drawing/2014/main" xmlns="" id="{B1020120-109F-4008-9782-225D7E01EA32}"/>
               </a:ext>
             </a:extLst>
           </p:cNvPr>
@@ -17093,7 +17088,7 @@
           <p:cNvPr id="5" name="Rectangle 4">
             <a:extLst>
               <a:ext uri="{FF2B5EF4-FFF2-40B4-BE49-F238E27FC236}">
-                <a16:creationId xmlns:a16="http://schemas.microsoft.com/office/drawing/2014/main" id="{43DD924A-D477-4E05-BBAE-ECFCBC293A95}"/>
+                <a16:creationId xmlns:a16="http://schemas.microsoft.com/office/drawing/2014/main" xmlns="" id="{43DD924A-D477-4E05-BBAE-ECFCBC293A95}"/>
               </a:ext>
             </a:extLst>
           </p:cNvPr>
@@ -17817,10 +17812,9 @@
           <a:lstStyle/>
           <a:p>
             <a:r>
-              <a:rPr lang="en-US"/>
+              <a:rPr lang="en-US" dirty="0"/>
               <a:t>Flattening Complex Objects</a:t>
             </a:r>
-            <a:endParaRPr lang="en-US" dirty="0"/>
           </a:p>
         </p:txBody>
       </p:sp>
@@ -18937,7 +18931,7 @@
           <p:cNvPr id="3" name="Content Placeholder 2">
             <a:extLst>
               <a:ext uri="{FF2B5EF4-FFF2-40B4-BE49-F238E27FC236}">
-                <a16:creationId xmlns:a16="http://schemas.microsoft.com/office/drawing/2014/main" id="{CEC64613-8B20-4F74-8C1F-D69D05C90F97}"/>
+                <a16:creationId xmlns:a16="http://schemas.microsoft.com/office/drawing/2014/main" xmlns="" id="{CEC64613-8B20-4F74-8C1F-D69D05C90F97}"/>
               </a:ext>
             </a:extLst>
           </p:cNvPr>
@@ -19066,7 +19060,7 @@
           <p:cNvPr id="4" name="Title 3">
             <a:extLst>
               <a:ext uri="{FF2B5EF4-FFF2-40B4-BE49-F238E27FC236}">
-                <a16:creationId xmlns:a16="http://schemas.microsoft.com/office/drawing/2014/main" id="{95DBE678-8993-4DCF-AA82-7930CD170D3B}"/>
+                <a16:creationId xmlns:a16="http://schemas.microsoft.com/office/drawing/2014/main" xmlns="" id="{95DBE678-8993-4DCF-AA82-7930CD170D3B}"/>
               </a:ext>
             </a:extLst>
           </p:cNvPr>
@@ -19083,7 +19077,7 @@
           <a:lstStyle/>
           <a:p>
             <a:r>
-              <a:rPr lang="en-US"/>
+              <a:rPr lang="en-US" dirty="0"/>
               <a:t>Mapping Collections</a:t>
             </a:r>
             <a:endParaRPr lang="en-US" noProof="1"/>
@@ -19095,7 +19089,7 @@
           <p:cNvPr id="2" name="Slide Number Placeholder 1">
             <a:extLst>
               <a:ext uri="{FF2B5EF4-FFF2-40B4-BE49-F238E27FC236}">
-                <a16:creationId xmlns:a16="http://schemas.microsoft.com/office/drawing/2014/main" id="{D2F537CF-166E-492B-BDD0-2E77B8481F6F}"/>
+                <a16:creationId xmlns:a16="http://schemas.microsoft.com/office/drawing/2014/main" xmlns="" id="{D2F537CF-166E-492B-BDD0-2E77B8481F6F}"/>
               </a:ext>
             </a:extLst>
           </p:cNvPr>
@@ -19125,7 +19119,7 @@
           <p:cNvPr id="5" name="Rectangle 4">
             <a:extLst>
               <a:ext uri="{FF2B5EF4-FFF2-40B4-BE49-F238E27FC236}">
-                <a16:creationId xmlns:a16="http://schemas.microsoft.com/office/drawing/2014/main" id="{61957D40-B97B-41FF-9111-BFD92A21AE4C}"/>
+                <a16:creationId xmlns:a16="http://schemas.microsoft.com/office/drawing/2014/main" xmlns="" id="{61957D40-B97B-41FF-9111-BFD92A21AE4C}"/>
               </a:ext>
             </a:extLst>
           </p:cNvPr>
@@ -19252,7 +19246,7 @@
           <p:cNvPr id="7" name="AutoShape 5">
             <a:extLst>
               <a:ext uri="{FF2B5EF4-FFF2-40B4-BE49-F238E27FC236}">
-                <a16:creationId xmlns:a16="http://schemas.microsoft.com/office/drawing/2014/main" id="{980EFBBD-0D61-4C5A-9D2F-2561C8F8D1BC}"/>
+                <a16:creationId xmlns:a16="http://schemas.microsoft.com/office/drawing/2014/main" xmlns="" id="{980EFBBD-0D61-4C5A-9D2F-2561C8F8D1BC}"/>
               </a:ext>
             </a:extLst>
           </p:cNvPr>
@@ -19336,7 +19330,7 @@
           <p:cNvPr id="8" name="AutoShape 5">
             <a:extLst>
               <a:ext uri="{FF2B5EF4-FFF2-40B4-BE49-F238E27FC236}">
-                <a16:creationId xmlns:a16="http://schemas.microsoft.com/office/drawing/2014/main" id="{8DA598DB-0DA5-4485-8B16-534B9E7C2D2C}"/>
+                <a16:creationId xmlns:a16="http://schemas.microsoft.com/office/drawing/2014/main" xmlns="" id="{8DA598DB-0DA5-4485-8B16-534B9E7C2D2C}"/>
               </a:ext>
             </a:extLst>
           </p:cNvPr>
@@ -19935,7 +19929,7 @@
           <p:cNvPr id="3" name="Content Placeholder 2">
             <a:extLst>
               <a:ext uri="{FF2B5EF4-FFF2-40B4-BE49-F238E27FC236}">
-                <a16:creationId xmlns:a16="http://schemas.microsoft.com/office/drawing/2014/main" id="{CEC64613-8B20-4F74-8C1F-D69D05C90F97}"/>
+                <a16:creationId xmlns:a16="http://schemas.microsoft.com/office/drawing/2014/main" xmlns="" id="{CEC64613-8B20-4F74-8C1F-D69D05C90F97}"/>
               </a:ext>
             </a:extLst>
           </p:cNvPr>
@@ -20037,7 +20031,7 @@
           <p:cNvPr id="4" name="Title 3">
             <a:extLst>
               <a:ext uri="{FF2B5EF4-FFF2-40B4-BE49-F238E27FC236}">
-                <a16:creationId xmlns:a16="http://schemas.microsoft.com/office/drawing/2014/main" id="{95DBE678-8993-4DCF-AA82-7930CD170D3B}"/>
+                <a16:creationId xmlns:a16="http://schemas.microsoft.com/office/drawing/2014/main" xmlns="" id="{95DBE678-8993-4DCF-AA82-7930CD170D3B}"/>
               </a:ext>
             </a:extLst>
           </p:cNvPr>
@@ -20066,7 +20060,7 @@
           <p:cNvPr id="2" name="Slide Number Placeholder 1">
             <a:extLst>
               <a:ext uri="{FF2B5EF4-FFF2-40B4-BE49-F238E27FC236}">
-                <a16:creationId xmlns:a16="http://schemas.microsoft.com/office/drawing/2014/main" id="{D2F537CF-166E-492B-BDD0-2E77B8481F6F}"/>
+                <a16:creationId xmlns:a16="http://schemas.microsoft.com/office/drawing/2014/main" xmlns="" id="{D2F537CF-166E-492B-BDD0-2E77B8481F6F}"/>
               </a:ext>
             </a:extLst>
           </p:cNvPr>
@@ -20096,7 +20090,7 @@
           <p:cNvPr id="5" name="Rectangle 4">
             <a:extLst>
               <a:ext uri="{FF2B5EF4-FFF2-40B4-BE49-F238E27FC236}">
-                <a16:creationId xmlns:a16="http://schemas.microsoft.com/office/drawing/2014/main" id="{ECA4C29B-0C27-4EF3-B92B-7DC434855BCC}"/>
+                <a16:creationId xmlns:a16="http://schemas.microsoft.com/office/drawing/2014/main" xmlns="" id="{ECA4C29B-0C27-4EF3-B92B-7DC434855BCC}"/>
               </a:ext>
             </a:extLst>
           </p:cNvPr>
@@ -20301,7 +20295,7 @@
           <p:cNvPr id="3" name="Content Placeholder 2">
             <a:extLst>
               <a:ext uri="{FF2B5EF4-FFF2-40B4-BE49-F238E27FC236}">
-                <a16:creationId xmlns:a16="http://schemas.microsoft.com/office/drawing/2014/main" id="{CEC64613-8B20-4F74-8C1F-D69D05C90F97}"/>
+                <a16:creationId xmlns:a16="http://schemas.microsoft.com/office/drawing/2014/main" xmlns="" id="{CEC64613-8B20-4F74-8C1F-D69D05C90F97}"/>
               </a:ext>
             </a:extLst>
           </p:cNvPr>
@@ -20368,7 +20362,7 @@
           <p:cNvPr id="4" name="Title 3">
             <a:extLst>
               <a:ext uri="{FF2B5EF4-FFF2-40B4-BE49-F238E27FC236}">
-                <a16:creationId xmlns:a16="http://schemas.microsoft.com/office/drawing/2014/main" id="{95DBE678-8993-4DCF-AA82-7930CD170D3B}"/>
+                <a16:creationId xmlns:a16="http://schemas.microsoft.com/office/drawing/2014/main" xmlns="" id="{95DBE678-8993-4DCF-AA82-7930CD170D3B}"/>
               </a:ext>
             </a:extLst>
           </p:cNvPr>
@@ -20399,7 +20393,7 @@
           <p:cNvPr id="2" name="Slide Number Placeholder 1">
             <a:extLst>
               <a:ext uri="{FF2B5EF4-FFF2-40B4-BE49-F238E27FC236}">
-                <a16:creationId xmlns:a16="http://schemas.microsoft.com/office/drawing/2014/main" id="{D2F537CF-166E-492B-BDD0-2E77B8481F6F}"/>
+                <a16:creationId xmlns:a16="http://schemas.microsoft.com/office/drawing/2014/main" xmlns="" id="{D2F537CF-166E-492B-BDD0-2E77B8481F6F}"/>
               </a:ext>
             </a:extLst>
           </p:cNvPr>
@@ -20429,7 +20423,7 @@
           <p:cNvPr id="5" name="Rectangle 4">
             <a:extLst>
               <a:ext uri="{FF2B5EF4-FFF2-40B4-BE49-F238E27FC236}">
-                <a16:creationId xmlns:a16="http://schemas.microsoft.com/office/drawing/2014/main" id="{ECA4C29B-0C27-4EF3-B92B-7DC434855BCC}"/>
+                <a16:creationId xmlns:a16="http://schemas.microsoft.com/office/drawing/2014/main" xmlns="" id="{ECA4C29B-0C27-4EF3-B92B-7DC434855BCC}"/>
               </a:ext>
             </a:extLst>
           </p:cNvPr>
@@ -20598,7 +20592,7 @@
           <p:cNvPr id="7" name="Rectangle 6">
             <a:extLst>
               <a:ext uri="{FF2B5EF4-FFF2-40B4-BE49-F238E27FC236}">
-                <a16:creationId xmlns:a16="http://schemas.microsoft.com/office/drawing/2014/main" id="{411B4772-8677-4DD7-B6DE-FAE2CCA3DE6A}"/>
+                <a16:creationId xmlns:a16="http://schemas.microsoft.com/office/drawing/2014/main" xmlns="" id="{411B4772-8677-4DD7-B6DE-FAE2CCA3DE6A}"/>
               </a:ext>
             </a:extLst>
           </p:cNvPr>
@@ -21331,10 +21325,9 @@
           <a:lstStyle/>
           <a:p>
             <a:r>
-              <a:rPr lang="en-US"/>
+              <a:rPr lang="en-US" dirty="0"/>
               <a:t>Inheritance Mapping</a:t>
             </a:r>
-            <a:endParaRPr lang="en-US" dirty="0"/>
           </a:p>
         </p:txBody>
       </p:sp>
@@ -22116,22 +22109,7 @@
                   </a:outerShdw>
                 </a:effectLst>
               </a:rPr>
-              <a:t>Register </a:t>
-            </a:r>
-            <a:r>
-              <a:rPr lang="en-US" sz="2400" b="1">
-                <a:solidFill>
-                  <a:srgbClr val="FFFFFF"/>
-                </a:solidFill>
-                <a:effectLst>
-                  <a:outerShdw blurRad="38100" dist="38100" dir="2700000" algn="tl">
-                    <a:srgbClr val="000000">
-                      <a:alpha val="43137"/>
-                    </a:srgbClr>
-                  </a:outerShdw>
-                </a:effectLst>
-              </a:rPr>
-              <a:t>with parent</a:t>
+              <a:t>Register with parent</a:t>
             </a:r>
             <a:endParaRPr lang="bg-BG" sz="2400" b="1" dirty="0">
               <a:solidFill>
@@ -23038,7 +23016,7 @@
           <p:cNvPr id="3" name="Content Placeholder 2">
             <a:extLst>
               <a:ext uri="{FF2B5EF4-FFF2-40B4-BE49-F238E27FC236}">
-                <a16:creationId xmlns:a16="http://schemas.microsoft.com/office/drawing/2014/main" id="{66266F8D-50DD-4C39-94EF-90EA4EA2A681}"/>
+                <a16:creationId xmlns:a16="http://schemas.microsoft.com/office/drawing/2014/main" xmlns="" id="{66266F8D-50DD-4C39-94EF-90EA4EA2A681}"/>
               </a:ext>
             </a:extLst>
           </p:cNvPr>
@@ -23099,7 +23077,7 @@
           <p:cNvPr id="4" name="Title 3">
             <a:extLst>
               <a:ext uri="{FF2B5EF4-FFF2-40B4-BE49-F238E27FC236}">
-                <a16:creationId xmlns:a16="http://schemas.microsoft.com/office/drawing/2014/main" id="{947C4F84-F00A-4260-BAA1-048D236D3123}"/>
+                <a16:creationId xmlns:a16="http://schemas.microsoft.com/office/drawing/2014/main" xmlns="" id="{947C4F84-F00A-4260-BAA1-048D236D3123}"/>
               </a:ext>
             </a:extLst>
           </p:cNvPr>
@@ -23116,10 +23094,9 @@
           <a:lstStyle/>
           <a:p>
             <a:r>
-              <a:rPr lang="en-US"/>
+              <a:rPr lang="en-US" dirty="0"/>
               <a:t>Mapping Profiles</a:t>
             </a:r>
-            <a:endParaRPr lang="en-US" dirty="0"/>
           </a:p>
         </p:txBody>
       </p:sp>
@@ -23128,7 +23105,7 @@
           <p:cNvPr id="2" name="Slide Number Placeholder 1">
             <a:extLst>
               <a:ext uri="{FF2B5EF4-FFF2-40B4-BE49-F238E27FC236}">
-                <a16:creationId xmlns:a16="http://schemas.microsoft.com/office/drawing/2014/main" id="{5DAD1909-BC73-4843-A39E-6E5A5E5A5522}"/>
+                <a16:creationId xmlns:a16="http://schemas.microsoft.com/office/drawing/2014/main" xmlns="" id="{5DAD1909-BC73-4843-A39E-6E5A5E5A5522}"/>
               </a:ext>
             </a:extLst>
           </p:cNvPr>
@@ -23158,7 +23135,7 @@
           <p:cNvPr id="5" name="Rectangle 4">
             <a:extLst>
               <a:ext uri="{FF2B5EF4-FFF2-40B4-BE49-F238E27FC236}">
-                <a16:creationId xmlns:a16="http://schemas.microsoft.com/office/drawing/2014/main" id="{8DA13E3A-6139-4298-B2F1-771564BCBC31}"/>
+                <a16:creationId xmlns:a16="http://schemas.microsoft.com/office/drawing/2014/main" xmlns="" id="{8DA13E3A-6139-4298-B2F1-771564BCBC31}"/>
               </a:ext>
             </a:extLst>
           </p:cNvPr>
@@ -23376,7 +23353,7 @@
           <p:cNvPr id="9" name="AutoShape 5">
             <a:extLst>
               <a:ext uri="{FF2B5EF4-FFF2-40B4-BE49-F238E27FC236}">
-                <a16:creationId xmlns:a16="http://schemas.microsoft.com/office/drawing/2014/main" id="{BE48B16B-DAB2-4051-9239-4DC08AF1E830}"/>
+                <a16:creationId xmlns:a16="http://schemas.microsoft.com/office/drawing/2014/main" xmlns="" id="{BE48B16B-DAB2-4051-9239-4DC08AF1E830}"/>
               </a:ext>
             </a:extLst>
           </p:cNvPr>
@@ -23490,7 +23467,7 @@
           <p:cNvPr id="10" name="Rectangle 9">
             <a:extLst>
               <a:ext uri="{FF2B5EF4-FFF2-40B4-BE49-F238E27FC236}">
-                <a16:creationId xmlns:a16="http://schemas.microsoft.com/office/drawing/2014/main" id="{8226A5FD-4230-45B1-8518-E0E93E0A92BB}"/>
+                <a16:creationId xmlns:a16="http://schemas.microsoft.com/office/drawing/2014/main" xmlns="" id="{8226A5FD-4230-45B1-8518-E0E93E0A92BB}"/>
               </a:ext>
             </a:extLst>
           </p:cNvPr>
@@ -24137,7 +24114,7 @@
           <p:cNvPr id="14" name="Text Placeholder 4">
             <a:extLst>
               <a:ext uri="{FF2B5EF4-FFF2-40B4-BE49-F238E27FC236}">
-                <a16:creationId xmlns:a16="http://schemas.microsoft.com/office/drawing/2014/main" id="{0E49D336-45B6-44D3-97C4-E28F8DEA2022}"/>
+                <a16:creationId xmlns:a16="http://schemas.microsoft.com/office/drawing/2014/main" xmlns="" id="{0E49D336-45B6-44D3-97C4-E28F8DEA2022}"/>
               </a:ext>
             </a:extLst>
           </p:cNvPr>
@@ -24344,7 +24321,7 @@
           <p:cNvPr id="9" name="Group 8">
             <a:extLst>
               <a:ext uri="{FF2B5EF4-FFF2-40B4-BE49-F238E27FC236}">
-                <a16:creationId xmlns:a16="http://schemas.microsoft.com/office/drawing/2014/main" id="{EBAFE522-EB7D-4931-A015-9A7E8A98517D}"/>
+                <a16:creationId xmlns:a16="http://schemas.microsoft.com/office/drawing/2014/main" xmlns="" id="{EBAFE522-EB7D-4931-A015-9A7E8A98517D}"/>
               </a:ext>
             </a:extLst>
           </p:cNvPr>
@@ -24364,7 +24341,7 @@
             <p:cNvPr id="10" name="Rounded Rectangle 10">
               <a:extLst>
                 <a:ext uri="{FF2B5EF4-FFF2-40B4-BE49-F238E27FC236}">
-                  <a16:creationId xmlns:a16="http://schemas.microsoft.com/office/drawing/2014/main" id="{18F78F23-3D09-4B63-8DF9-D49CFBB145EE}"/>
+                  <a16:creationId xmlns:a16="http://schemas.microsoft.com/office/drawing/2014/main" xmlns="" id="{18F78F23-3D09-4B63-8DF9-D49CFBB145EE}"/>
                 </a:ext>
               </a:extLst>
             </p:cNvPr>
@@ -24447,7 +24424,7 @@
             <p:cNvPr id="11" name="Rounded Rectangle 16">
               <a:extLst>
                 <a:ext uri="{FF2B5EF4-FFF2-40B4-BE49-F238E27FC236}">
-                  <a16:creationId xmlns:a16="http://schemas.microsoft.com/office/drawing/2014/main" id="{F12C06CE-2BBE-46C2-B718-813794C58DF9}"/>
+                  <a16:creationId xmlns:a16="http://schemas.microsoft.com/office/drawing/2014/main" xmlns="" id="{F12C06CE-2BBE-46C2-B718-813794C58DF9}"/>
                 </a:ext>
               </a:extLst>
             </p:cNvPr>
@@ -24532,7 +24509,7 @@
             <p:cNvPr id="12" name="Half Frame 11">
               <a:extLst>
                 <a:ext uri="{FF2B5EF4-FFF2-40B4-BE49-F238E27FC236}">
-                  <a16:creationId xmlns:a16="http://schemas.microsoft.com/office/drawing/2014/main" id="{66CDBB1E-AF3C-43FC-9F34-2DD691F81726}"/>
+                  <a16:creationId xmlns:a16="http://schemas.microsoft.com/office/drawing/2014/main" xmlns="" id="{66CDBB1E-AF3C-43FC-9F34-2DD691F81726}"/>
                 </a:ext>
               </a:extLst>
             </p:cNvPr>
@@ -24619,7 +24596,7 @@
           <p:cNvPr id="13" name="Picture 12">
             <a:extLst>
               <a:ext uri="{FF2B5EF4-FFF2-40B4-BE49-F238E27FC236}">
-                <a16:creationId xmlns:a16="http://schemas.microsoft.com/office/drawing/2014/main" id="{CCC3A316-993C-4741-8826-E104F27650A3}"/>
+                <a16:creationId xmlns:a16="http://schemas.microsoft.com/office/drawing/2014/main" xmlns="" id="{CCC3A316-993C-4741-8826-E104F27650A3}"/>
               </a:ext>
             </a:extLst>
           </p:cNvPr>
@@ -24654,7 +24631,7 @@
           <p:cNvPr id="15" name="Content Placeholder 4">
             <a:extLst>
               <a:ext uri="{FF2B5EF4-FFF2-40B4-BE49-F238E27FC236}">
-                <a16:creationId xmlns:a16="http://schemas.microsoft.com/office/drawing/2014/main" id="{B96A0DF8-27E7-4DC8-BBE3-7238AAAEB845}"/>
+                <a16:creationId xmlns:a16="http://schemas.microsoft.com/office/drawing/2014/main" xmlns="" id="{B96A0DF8-27E7-4DC8-BBE3-7238AAAEB845}"/>
               </a:ext>
             </a:extLst>
           </p:cNvPr>
@@ -25179,7 +25156,7 @@
           <p:cNvPr id="2" name="Text Placeholder 2">
             <a:extLst>
               <a:ext uri="{FF2B5EF4-FFF2-40B4-BE49-F238E27FC236}">
-                <a16:creationId xmlns:a16="http://schemas.microsoft.com/office/drawing/2014/main" id="{6CE1EE33-3758-45AB-AA74-E69261DB6AB5}"/>
+                <a16:creationId xmlns:a16="http://schemas.microsoft.com/office/drawing/2014/main" xmlns="" id="{6CE1EE33-3758-45AB-AA74-E69261DB6AB5}"/>
               </a:ext>
             </a:extLst>
           </p:cNvPr>
@@ -25858,7 +25835,7 @@
             <a:hlinkClick r:id="rId23"/>
             <a:extLst>
               <a:ext uri="{FF2B5EF4-FFF2-40B4-BE49-F238E27FC236}">
-                <a16:creationId xmlns:a16="http://schemas.microsoft.com/office/drawing/2014/main" id="{0FDF11E6-F5ED-4FB2-96CD-9D306D28A0DB}"/>
+                <a16:creationId xmlns:a16="http://schemas.microsoft.com/office/drawing/2014/main" xmlns="" id="{0FDF11E6-F5ED-4FB2-96CD-9D306D28A0DB}"/>
               </a:ext>
             </a:extLst>
           </p:cNvPr>
@@ -26013,7 +25990,7 @@
           <p:cNvPr id="7" name="Group 6">
             <a:extLst>
               <a:ext uri="{FF2B5EF4-FFF2-40B4-BE49-F238E27FC236}">
-                <a16:creationId xmlns:a16="http://schemas.microsoft.com/office/drawing/2014/main" id="{8F94737B-4698-41F8-AC81-9324F12880B9}"/>
+                <a16:creationId xmlns:a16="http://schemas.microsoft.com/office/drawing/2014/main" xmlns="" id="{8F94737B-4698-41F8-AC81-9324F12880B9}"/>
               </a:ext>
             </a:extLst>
           </p:cNvPr>
@@ -26886,10 +26863,9 @@
           <a:lstStyle/>
           <a:p>
             <a:r>
-              <a:rPr lang="en-US"/>
+              <a:rPr lang="en-US" dirty="0"/>
               <a:t>What is a Data Transfer Object?</a:t>
             </a:r>
-            <a:endParaRPr lang="en-US" dirty="0"/>
           </a:p>
         </p:txBody>
       </p:sp>
@@ -27410,10 +27386,9 @@
           <a:lstStyle/>
           <a:p>
             <a:r>
-              <a:rPr lang="en-US"/>
+              <a:rPr lang="en-US" dirty="0"/>
               <a:t>DTO Usage Scenarios</a:t>
             </a:r>
-            <a:endParaRPr lang="en-US" dirty="0"/>
           </a:p>
         </p:txBody>
       </p:sp>
@@ -27743,10 +27718,9 @@
           <a:lstStyle/>
           <a:p>
             <a:r>
-              <a:rPr lang="en-US"/>
+              <a:rPr lang="en-US" dirty="0"/>
               <a:t>Manual Mapping</a:t>
             </a:r>
-            <a:endParaRPr lang="en-US" dirty="0"/>
           </a:p>
         </p:txBody>
       </p:sp>
@@ -29191,7 +29165,7 @@
           <p:cNvPr id="1026" name="Picture 2" descr="http://automapper.org/images/black_logo.png">
             <a:extLst>
               <a:ext uri="{FF2B5EF4-FFF2-40B4-BE49-F238E27FC236}">
-                <a16:creationId xmlns:a16="http://schemas.microsoft.com/office/drawing/2014/main" id="{F7B3183E-A5F4-4326-98EA-E69FDE1C5109}"/>
+                <a16:creationId xmlns:a16="http://schemas.microsoft.com/office/drawing/2014/main" xmlns="" id="{F7B3183E-A5F4-4326-98EA-E69FDE1C5109}"/>
               </a:ext>
             </a:extLst>
           </p:cNvPr>
@@ -29637,7 +29611,7 @@
   <a:extraClrSchemeLst/>
   <a:extLst>
     <a:ext uri="{05A4C25C-085E-4340-85A3-A5531E510DB2}">
-      <thm15:themeFamily xmlns:thm15="http://schemas.microsoft.com/office/thememl/2012/main" name="SoftUni3_1" id="{D61FAD9B-6E74-4E03-BFE4-B363D484F1DA}" vid="{7089C1A3-635B-4B03-A017-DAF10A3A396B}"/>
+      <thm15:themeFamily xmlns:thm15="http://schemas.microsoft.com/office/thememl/2012/main" xmlns="" name="SoftUni3_1" id="{D61FAD9B-6E74-4E03-BFE4-B363D484F1DA}" vid="{7089C1A3-635B-4B03-A017-DAF10A3A396B}"/>
     </a:ext>
   </a:extLst>
 </a:theme>
@@ -29932,7 +29906,7 @@
   <a:extraClrSchemeLst/>
   <a:extLst>
     <a:ext uri="{05A4C25C-085E-4340-85A3-A5531E510DB2}">
-      <thm15:themeFamily xmlns:thm15="http://schemas.microsoft.com/office/thememl/2012/main" name="Office Theme" id="{62F939B6-93AF-4DB8-9C6B-D6C7DFDC589F}" vid="{4A3C46E8-61CC-4603-A589-7422A47A8E4A}"/>
+      <thm15:themeFamily xmlns:thm15="http://schemas.microsoft.com/office/thememl/2012/main" xmlns="" name="Office Theme" id="{62F939B6-93AF-4DB8-9C6B-D6C7DFDC589F}" vid="{4A3C46E8-61CC-4603-A589-7422A47A8E4A}"/>
     </a:ext>
   </a:extLst>
 </a:theme>
@@ -30227,7 +30201,7 @@
   <a:extraClrSchemeLst/>
   <a:extLst>
     <a:ext uri="{05A4C25C-085E-4340-85A3-A5531E510DB2}">
-      <thm15:themeFamily xmlns:thm15="http://schemas.microsoft.com/office/thememl/2012/main" name="Office Theme" id="{62F939B6-93AF-4DB8-9C6B-D6C7DFDC589F}" vid="{4A3C46E8-61CC-4603-A589-7422A47A8E4A}"/>
+      <thm15:themeFamily xmlns:thm15="http://schemas.microsoft.com/office/thememl/2012/main" xmlns="" name="Office Theme" id="{62F939B6-93AF-4DB8-9C6B-D6C7DFDC589F}" vid="{4A3C46E8-61CC-4603-A589-7422A47A8E4A}"/>
     </a:ext>
   </a:extLst>
 </a:theme>

</xml_diff>